<commit_message>
move and circular queue
</commit_message>
<xml_diff>
--- a/queue/queue.pptx
+++ b/queue/queue.pptx
@@ -5,12 +5,14 @@
     <p:sldMasterId id="2147483648" r:id="rId1"/>
   </p:sldMasterIdLst>
   <p:notesMasterIdLst>
-    <p:notesMasterId r:id="rId5"/>
+    <p:notesMasterId r:id="rId7"/>
   </p:notesMasterIdLst>
   <p:sldIdLst>
     <p:sldId id="256" r:id="rId2"/>
     <p:sldId id="259" r:id="rId3"/>
     <p:sldId id="260" r:id="rId4"/>
+    <p:sldId id="261" r:id="rId5"/>
+    <p:sldId id="262" r:id="rId6"/>
   </p:sldIdLst>
   <p:sldSz cx="12192000" cy="6858000"/>
   <p:notesSz cx="6858000" cy="9144000"/>
@@ -199,7 +201,7 @@
           <a:p>
             <a:fld id="{EF89B589-35CB-4095-89F3-CBA9C3D5C94E}" type="datetimeFigureOut">
               <a:rPr lang="ko-KR" altLang="en-US" smtClean="0"/>
-              <a:t>2022-03-03 Thu요일</a:t>
+              <a:t>2022-03-06 Sun요일</a:t>
             </a:fld>
             <a:endParaRPr lang="ko-KR" altLang="en-US"/>
           </a:p>
@@ -613,7 +615,7 @@
           <a:p>
             <a:fld id="{3F5DACAA-BDF7-41DD-B2E5-E4E78D96A16D}" type="datetimeFigureOut">
               <a:rPr lang="ko-KR" altLang="en-US" smtClean="0"/>
-              <a:t>2022-03-03 Thu요일</a:t>
+              <a:t>2022-03-06 Sun요일</a:t>
             </a:fld>
             <a:endParaRPr lang="ko-KR" altLang="en-US"/>
           </a:p>
@@ -811,7 +813,7 @@
           <a:p>
             <a:fld id="{3F5DACAA-BDF7-41DD-B2E5-E4E78D96A16D}" type="datetimeFigureOut">
               <a:rPr lang="ko-KR" altLang="en-US" smtClean="0"/>
-              <a:t>2022-03-03 Thu요일</a:t>
+              <a:t>2022-03-06 Sun요일</a:t>
             </a:fld>
             <a:endParaRPr lang="ko-KR" altLang="en-US"/>
           </a:p>
@@ -1019,7 +1021,7 @@
           <a:p>
             <a:fld id="{3F5DACAA-BDF7-41DD-B2E5-E4E78D96A16D}" type="datetimeFigureOut">
               <a:rPr lang="ko-KR" altLang="en-US" smtClean="0"/>
-              <a:t>2022-03-03 Thu요일</a:t>
+              <a:t>2022-03-06 Sun요일</a:t>
             </a:fld>
             <a:endParaRPr lang="ko-KR" altLang="en-US"/>
           </a:p>
@@ -1217,7 +1219,7 @@
           <a:p>
             <a:fld id="{3F5DACAA-BDF7-41DD-B2E5-E4E78D96A16D}" type="datetimeFigureOut">
               <a:rPr lang="ko-KR" altLang="en-US" smtClean="0"/>
-              <a:t>2022-03-03 Thu요일</a:t>
+              <a:t>2022-03-06 Sun요일</a:t>
             </a:fld>
             <a:endParaRPr lang="ko-KR" altLang="en-US"/>
           </a:p>
@@ -1492,7 +1494,7 @@
           <a:p>
             <a:fld id="{3F5DACAA-BDF7-41DD-B2E5-E4E78D96A16D}" type="datetimeFigureOut">
               <a:rPr lang="ko-KR" altLang="en-US" smtClean="0"/>
-              <a:t>2022-03-03 Thu요일</a:t>
+              <a:t>2022-03-06 Sun요일</a:t>
             </a:fld>
             <a:endParaRPr lang="ko-KR" altLang="en-US"/>
           </a:p>
@@ -1757,7 +1759,7 @@
           <a:p>
             <a:fld id="{3F5DACAA-BDF7-41DD-B2E5-E4E78D96A16D}" type="datetimeFigureOut">
               <a:rPr lang="ko-KR" altLang="en-US" smtClean="0"/>
-              <a:t>2022-03-03 Thu요일</a:t>
+              <a:t>2022-03-06 Sun요일</a:t>
             </a:fld>
             <a:endParaRPr lang="ko-KR" altLang="en-US"/>
           </a:p>
@@ -2169,7 +2171,7 @@
           <a:p>
             <a:fld id="{3F5DACAA-BDF7-41DD-B2E5-E4E78D96A16D}" type="datetimeFigureOut">
               <a:rPr lang="ko-KR" altLang="en-US" smtClean="0"/>
-              <a:t>2022-03-03 Thu요일</a:t>
+              <a:t>2022-03-06 Sun요일</a:t>
             </a:fld>
             <a:endParaRPr lang="ko-KR" altLang="en-US"/>
           </a:p>
@@ -2310,7 +2312,7 @@
           <a:p>
             <a:fld id="{3F5DACAA-BDF7-41DD-B2E5-E4E78D96A16D}" type="datetimeFigureOut">
               <a:rPr lang="ko-KR" altLang="en-US" smtClean="0"/>
-              <a:t>2022-03-03 Thu요일</a:t>
+              <a:t>2022-03-06 Sun요일</a:t>
             </a:fld>
             <a:endParaRPr lang="ko-KR" altLang="en-US"/>
           </a:p>
@@ -2423,7 +2425,7 @@
           <a:p>
             <a:fld id="{3F5DACAA-BDF7-41DD-B2E5-E4E78D96A16D}" type="datetimeFigureOut">
               <a:rPr lang="ko-KR" altLang="en-US" smtClean="0"/>
-              <a:t>2022-03-03 Thu요일</a:t>
+              <a:t>2022-03-06 Sun요일</a:t>
             </a:fld>
             <a:endParaRPr lang="ko-KR" altLang="en-US"/>
           </a:p>
@@ -2734,7 +2736,7 @@
           <a:p>
             <a:fld id="{3F5DACAA-BDF7-41DD-B2E5-E4E78D96A16D}" type="datetimeFigureOut">
               <a:rPr lang="ko-KR" altLang="en-US" smtClean="0"/>
-              <a:t>2022-03-03 Thu요일</a:t>
+              <a:t>2022-03-06 Sun요일</a:t>
             </a:fld>
             <a:endParaRPr lang="ko-KR" altLang="en-US"/>
           </a:p>
@@ -3022,7 +3024,7 @@
           <a:p>
             <a:fld id="{3F5DACAA-BDF7-41DD-B2E5-E4E78D96A16D}" type="datetimeFigureOut">
               <a:rPr lang="ko-KR" altLang="en-US" smtClean="0"/>
-              <a:t>2022-03-03 Thu요일</a:t>
+              <a:t>2022-03-06 Sun요일</a:t>
             </a:fld>
             <a:endParaRPr lang="ko-KR" altLang="en-US"/>
           </a:p>
@@ -3263,7 +3265,7 @@
           <a:p>
             <a:fld id="{3F5DACAA-BDF7-41DD-B2E5-E4E78D96A16D}" type="datetimeFigureOut">
               <a:rPr lang="ko-KR" altLang="en-US" smtClean="0"/>
-              <a:t>2022-03-03 Thu요일</a:t>
+              <a:t>2022-03-06 Sun요일</a:t>
             </a:fld>
             <a:endParaRPr lang="ko-KR" altLang="en-US"/>
           </a:p>
@@ -6263,6 +6265,2982 @@
     <p:extLst>
       <p:ext uri="{BB962C8B-B14F-4D97-AF65-F5344CB8AC3E}">
         <p14:creationId xmlns:p14="http://schemas.microsoft.com/office/powerpoint/2010/main" val="3754018"/>
+      </p:ext>
+    </p:extLst>
+  </p:cSld>
+  <p:clrMapOvr>
+    <a:masterClrMapping/>
+  </p:clrMapOvr>
+</p:sld>
+</file>
+
+<file path=ppt/slides/slide4.xml><?xml version="1.0" encoding="utf-8"?>
+<p:sld xmlns:a="http://schemas.openxmlformats.org/drawingml/2006/main" xmlns:r="http://schemas.openxmlformats.org/officeDocument/2006/relationships" xmlns:p="http://schemas.openxmlformats.org/presentationml/2006/main">
+  <p:cSld>
+    <p:spTree>
+      <p:nvGrpSpPr>
+        <p:cNvPr id="1" name=""/>
+        <p:cNvGrpSpPr/>
+        <p:nvPr/>
+      </p:nvGrpSpPr>
+      <p:grpSpPr>
+        <a:xfrm>
+          <a:off x="0" y="0"/>
+          <a:ext cx="0" cy="0"/>
+          <a:chOff x="0" y="0"/>
+          <a:chExt cx="0" cy="0"/>
+        </a:xfrm>
+      </p:grpSpPr>
+      <p:sp>
+        <p:nvSpPr>
+          <p:cNvPr id="23" name="직사각형 22">
+            <a:extLst>
+              <a:ext uri="{FF2B5EF4-FFF2-40B4-BE49-F238E27FC236}">
+                <a16:creationId xmlns:a16="http://schemas.microsoft.com/office/drawing/2014/main" id="{3F4C1C6C-BD90-447D-8413-E68AD6047B56}"/>
+              </a:ext>
+            </a:extLst>
+          </p:cNvPr>
+          <p:cNvSpPr/>
+          <p:nvPr/>
+        </p:nvSpPr>
+        <p:spPr>
+          <a:xfrm>
+            <a:off x="2797522" y="2245307"/>
+            <a:ext cx="2283681" cy="4041059"/>
+          </a:xfrm>
+          <a:prstGeom prst="rect">
+            <a:avLst/>
+          </a:prstGeom>
+        </p:spPr>
+        <p:style>
+          <a:lnRef idx="2">
+            <a:schemeClr val="dk1"/>
+          </a:lnRef>
+          <a:fillRef idx="1">
+            <a:schemeClr val="lt1"/>
+          </a:fillRef>
+          <a:effectRef idx="0">
+            <a:schemeClr val="dk1"/>
+          </a:effectRef>
+          <a:fontRef idx="minor">
+            <a:schemeClr val="dk1"/>
+          </a:fontRef>
+        </p:style>
+        <p:txBody>
+          <a:bodyPr rtlCol="0" anchor="ctr"/>
+          <a:lstStyle/>
+          <a:p>
+            <a:pPr algn="ctr"/>
+            <a:endParaRPr lang="ko-KR" altLang="en-US"/>
+          </a:p>
+        </p:txBody>
+      </p:sp>
+      <p:cxnSp>
+        <p:nvCxnSpPr>
+          <p:cNvPr id="25" name="직선 연결선 24">
+            <a:extLst>
+              <a:ext uri="{FF2B5EF4-FFF2-40B4-BE49-F238E27FC236}">
+                <a16:creationId xmlns:a16="http://schemas.microsoft.com/office/drawing/2014/main" id="{36887506-3D3A-40F7-A0DF-147775B7B4CC}"/>
+              </a:ext>
+            </a:extLst>
+          </p:cNvPr>
+          <p:cNvCxnSpPr>
+            <a:cxnSpLocks/>
+          </p:cNvCxnSpPr>
+          <p:nvPr/>
+        </p:nvCxnSpPr>
+        <p:spPr>
+          <a:xfrm>
+            <a:off x="2797522" y="3031887"/>
+            <a:ext cx="2272030" cy="0"/>
+          </a:xfrm>
+          <a:prstGeom prst="line">
+            <a:avLst/>
+          </a:prstGeom>
+        </p:spPr>
+        <p:style>
+          <a:lnRef idx="1">
+            <a:schemeClr val="dk1"/>
+          </a:lnRef>
+          <a:fillRef idx="0">
+            <a:schemeClr val="dk1"/>
+          </a:fillRef>
+          <a:effectRef idx="0">
+            <a:schemeClr val="dk1"/>
+          </a:effectRef>
+          <a:fontRef idx="minor">
+            <a:schemeClr val="tx1"/>
+          </a:fontRef>
+        </p:style>
+      </p:cxnSp>
+      <p:cxnSp>
+        <p:nvCxnSpPr>
+          <p:cNvPr id="26" name="직선 연결선 25">
+            <a:extLst>
+              <a:ext uri="{FF2B5EF4-FFF2-40B4-BE49-F238E27FC236}">
+                <a16:creationId xmlns:a16="http://schemas.microsoft.com/office/drawing/2014/main" id="{EF29291C-834B-499E-AF94-E680B5418C5B}"/>
+              </a:ext>
+            </a:extLst>
+          </p:cNvPr>
+          <p:cNvCxnSpPr>
+            <a:cxnSpLocks/>
+          </p:cNvCxnSpPr>
+          <p:nvPr/>
+        </p:nvCxnSpPr>
+        <p:spPr>
+          <a:xfrm>
+            <a:off x="2797522" y="3818467"/>
+            <a:ext cx="2272030" cy="0"/>
+          </a:xfrm>
+          <a:prstGeom prst="line">
+            <a:avLst/>
+          </a:prstGeom>
+        </p:spPr>
+        <p:style>
+          <a:lnRef idx="1">
+            <a:schemeClr val="dk1"/>
+          </a:lnRef>
+          <a:fillRef idx="0">
+            <a:schemeClr val="dk1"/>
+          </a:fillRef>
+          <a:effectRef idx="0">
+            <a:schemeClr val="dk1"/>
+          </a:effectRef>
+          <a:fontRef idx="minor">
+            <a:schemeClr val="tx1"/>
+          </a:fontRef>
+        </p:style>
+      </p:cxnSp>
+      <p:cxnSp>
+        <p:nvCxnSpPr>
+          <p:cNvPr id="27" name="직선 연결선 26">
+            <a:extLst>
+              <a:ext uri="{FF2B5EF4-FFF2-40B4-BE49-F238E27FC236}">
+                <a16:creationId xmlns:a16="http://schemas.microsoft.com/office/drawing/2014/main" id="{EFF2AD76-92E8-4E23-8DC7-1131314C0C20}"/>
+              </a:ext>
+            </a:extLst>
+          </p:cNvPr>
+          <p:cNvCxnSpPr>
+            <a:cxnSpLocks/>
+          </p:cNvCxnSpPr>
+          <p:nvPr/>
+        </p:nvCxnSpPr>
+        <p:spPr>
+          <a:xfrm>
+            <a:off x="2785232" y="4585384"/>
+            <a:ext cx="2272030" cy="0"/>
+          </a:xfrm>
+          <a:prstGeom prst="line">
+            <a:avLst/>
+          </a:prstGeom>
+        </p:spPr>
+        <p:style>
+          <a:lnRef idx="1">
+            <a:schemeClr val="dk1"/>
+          </a:lnRef>
+          <a:fillRef idx="0">
+            <a:schemeClr val="dk1"/>
+          </a:fillRef>
+          <a:effectRef idx="0">
+            <a:schemeClr val="dk1"/>
+          </a:effectRef>
+          <a:fontRef idx="minor">
+            <a:schemeClr val="tx1"/>
+          </a:fontRef>
+        </p:style>
+      </p:cxnSp>
+      <p:cxnSp>
+        <p:nvCxnSpPr>
+          <p:cNvPr id="28" name="직선 연결선 27">
+            <a:extLst>
+              <a:ext uri="{FF2B5EF4-FFF2-40B4-BE49-F238E27FC236}">
+                <a16:creationId xmlns:a16="http://schemas.microsoft.com/office/drawing/2014/main" id="{CF6EB6D4-B905-4B91-B14C-FA7AD3167D3E}"/>
+              </a:ext>
+            </a:extLst>
+          </p:cNvPr>
+          <p:cNvCxnSpPr>
+            <a:cxnSpLocks/>
+          </p:cNvCxnSpPr>
+          <p:nvPr/>
+        </p:nvCxnSpPr>
+        <p:spPr>
+          <a:xfrm>
+            <a:off x="2785232" y="5426041"/>
+            <a:ext cx="2272030" cy="0"/>
+          </a:xfrm>
+          <a:prstGeom prst="line">
+            <a:avLst/>
+          </a:prstGeom>
+        </p:spPr>
+        <p:style>
+          <a:lnRef idx="1">
+            <a:schemeClr val="dk1"/>
+          </a:lnRef>
+          <a:fillRef idx="0">
+            <a:schemeClr val="dk1"/>
+          </a:fillRef>
+          <a:effectRef idx="0">
+            <a:schemeClr val="dk1"/>
+          </a:effectRef>
+          <a:fontRef idx="minor">
+            <a:schemeClr val="tx1"/>
+          </a:fontRef>
+        </p:style>
+      </p:cxnSp>
+      <p:sp>
+        <p:nvSpPr>
+          <p:cNvPr id="41" name="TextBox 40">
+            <a:extLst>
+              <a:ext uri="{FF2B5EF4-FFF2-40B4-BE49-F238E27FC236}">
+                <a16:creationId xmlns:a16="http://schemas.microsoft.com/office/drawing/2014/main" id="{22B6B0D3-B1D4-4F89-8A50-D3B1DE032F3C}"/>
+              </a:ext>
+            </a:extLst>
+          </p:cNvPr>
+          <p:cNvSpPr txBox="1"/>
+          <p:nvPr/>
+        </p:nvSpPr>
+        <p:spPr>
+          <a:xfrm>
+            <a:off x="3650297" y="3761133"/>
+            <a:ext cx="606256" cy="861774"/>
+          </a:xfrm>
+          <a:prstGeom prst="rect">
+            <a:avLst/>
+          </a:prstGeom>
+          <a:noFill/>
+        </p:spPr>
+        <p:txBody>
+          <a:bodyPr wrap="none" rtlCol="0">
+            <a:spAutoFit/>
+          </a:bodyPr>
+          <a:lstStyle/>
+          <a:p>
+            <a:r>
+              <a:rPr lang="en-US" altLang="ko-KR" sz="5000" dirty="0"/>
+              <a:t>A</a:t>
+            </a:r>
+            <a:endParaRPr lang="ko-KR" altLang="en-US" sz="5000" dirty="0"/>
+          </a:p>
+        </p:txBody>
+      </p:sp>
+      <p:sp>
+        <p:nvSpPr>
+          <p:cNvPr id="46" name="TextBox 45">
+            <a:extLst>
+              <a:ext uri="{FF2B5EF4-FFF2-40B4-BE49-F238E27FC236}">
+                <a16:creationId xmlns:a16="http://schemas.microsoft.com/office/drawing/2014/main" id="{5FAF1532-F3DD-4529-BA39-0488FD64897F}"/>
+              </a:ext>
+            </a:extLst>
+          </p:cNvPr>
+          <p:cNvSpPr txBox="1"/>
+          <p:nvPr/>
+        </p:nvSpPr>
+        <p:spPr>
+          <a:xfrm>
+            <a:off x="2249883" y="2416436"/>
+            <a:ext cx="360996" cy="477054"/>
+          </a:xfrm>
+          <a:prstGeom prst="rect">
+            <a:avLst/>
+          </a:prstGeom>
+          <a:noFill/>
+        </p:spPr>
+        <p:txBody>
+          <a:bodyPr wrap="none" rtlCol="0">
+            <a:spAutoFit/>
+          </a:bodyPr>
+          <a:lstStyle/>
+          <a:p>
+            <a:r>
+              <a:rPr lang="en-US" altLang="ko-KR" sz="2500" dirty="0"/>
+              <a:t>1</a:t>
+            </a:r>
+            <a:endParaRPr lang="ko-KR" altLang="en-US" sz="2500" dirty="0"/>
+          </a:p>
+        </p:txBody>
+      </p:sp>
+      <p:sp>
+        <p:nvSpPr>
+          <p:cNvPr id="9" name="직사각형 8">
+            <a:extLst>
+              <a:ext uri="{FF2B5EF4-FFF2-40B4-BE49-F238E27FC236}">
+                <a16:creationId xmlns:a16="http://schemas.microsoft.com/office/drawing/2014/main" id="{92BF9B99-DF8B-4CA8-A774-47620C0A237E}"/>
+              </a:ext>
+            </a:extLst>
+          </p:cNvPr>
+          <p:cNvSpPr/>
+          <p:nvPr/>
+        </p:nvSpPr>
+        <p:spPr>
+          <a:xfrm>
+            <a:off x="2177053" y="793604"/>
+            <a:ext cx="3451143" cy="858653"/>
+          </a:xfrm>
+          <a:prstGeom prst="rect">
+            <a:avLst/>
+          </a:prstGeom>
+          <a:noFill/>
+          <a:ln>
+            <a:solidFill>
+              <a:schemeClr val="tx1"/>
+            </a:solidFill>
+          </a:ln>
+        </p:spPr>
+        <p:style>
+          <a:lnRef idx="2">
+            <a:schemeClr val="accent1">
+              <a:shade val="50000"/>
+            </a:schemeClr>
+          </a:lnRef>
+          <a:fillRef idx="1">
+            <a:schemeClr val="accent1"/>
+          </a:fillRef>
+          <a:effectRef idx="0">
+            <a:schemeClr val="accent1"/>
+          </a:effectRef>
+          <a:fontRef idx="minor">
+            <a:schemeClr val="lt1"/>
+          </a:fontRef>
+        </p:style>
+        <p:txBody>
+          <a:bodyPr rtlCol="0" anchor="ctr"/>
+          <a:lstStyle/>
+          <a:p>
+            <a:pPr algn="ctr"/>
+            <a:endParaRPr lang="ko-KR" altLang="en-US"/>
+          </a:p>
+        </p:txBody>
+      </p:sp>
+      <p:sp>
+        <p:nvSpPr>
+          <p:cNvPr id="53" name="TextBox 52">
+            <a:extLst>
+              <a:ext uri="{FF2B5EF4-FFF2-40B4-BE49-F238E27FC236}">
+                <a16:creationId xmlns:a16="http://schemas.microsoft.com/office/drawing/2014/main" id="{B6A3435C-9BFD-4CCD-889B-52FEB09B3B23}"/>
+              </a:ext>
+            </a:extLst>
+          </p:cNvPr>
+          <p:cNvSpPr txBox="1"/>
+          <p:nvPr/>
+        </p:nvSpPr>
+        <p:spPr>
+          <a:xfrm>
+            <a:off x="2249883" y="3217016"/>
+            <a:ext cx="360996" cy="477054"/>
+          </a:xfrm>
+          <a:prstGeom prst="rect">
+            <a:avLst/>
+          </a:prstGeom>
+          <a:noFill/>
+        </p:spPr>
+        <p:txBody>
+          <a:bodyPr wrap="none" rtlCol="0">
+            <a:spAutoFit/>
+          </a:bodyPr>
+          <a:lstStyle/>
+          <a:p>
+            <a:r>
+              <a:rPr lang="en-US" altLang="ko-KR" sz="2500" dirty="0"/>
+              <a:t>2</a:t>
+            </a:r>
+            <a:endParaRPr lang="ko-KR" altLang="en-US" sz="2500" dirty="0"/>
+          </a:p>
+        </p:txBody>
+      </p:sp>
+      <p:sp>
+        <p:nvSpPr>
+          <p:cNvPr id="55" name="TextBox 54">
+            <a:extLst>
+              <a:ext uri="{FF2B5EF4-FFF2-40B4-BE49-F238E27FC236}">
+                <a16:creationId xmlns:a16="http://schemas.microsoft.com/office/drawing/2014/main" id="{A20298B8-728F-4A05-ACF8-9C3C4B74A8BC}"/>
+              </a:ext>
+            </a:extLst>
+          </p:cNvPr>
+          <p:cNvSpPr txBox="1"/>
+          <p:nvPr/>
+        </p:nvSpPr>
+        <p:spPr>
+          <a:xfrm>
+            <a:off x="2262311" y="4775355"/>
+            <a:ext cx="360996" cy="477054"/>
+          </a:xfrm>
+          <a:prstGeom prst="rect">
+            <a:avLst/>
+          </a:prstGeom>
+          <a:noFill/>
+        </p:spPr>
+        <p:txBody>
+          <a:bodyPr wrap="none" rtlCol="0">
+            <a:spAutoFit/>
+          </a:bodyPr>
+          <a:lstStyle/>
+          <a:p>
+            <a:r>
+              <a:rPr lang="en-US" altLang="ko-KR" sz="2500" dirty="0"/>
+              <a:t>4</a:t>
+            </a:r>
+            <a:endParaRPr lang="ko-KR" altLang="en-US" sz="2500" dirty="0"/>
+          </a:p>
+        </p:txBody>
+      </p:sp>
+      <p:sp>
+        <p:nvSpPr>
+          <p:cNvPr id="56" name="TextBox 55">
+            <a:extLst>
+              <a:ext uri="{FF2B5EF4-FFF2-40B4-BE49-F238E27FC236}">
+                <a16:creationId xmlns:a16="http://schemas.microsoft.com/office/drawing/2014/main" id="{51442F0F-20B2-4400-9601-46751CA2F76B}"/>
+              </a:ext>
+            </a:extLst>
+          </p:cNvPr>
+          <p:cNvSpPr txBox="1"/>
+          <p:nvPr/>
+        </p:nvSpPr>
+        <p:spPr>
+          <a:xfrm>
+            <a:off x="2262311" y="5603330"/>
+            <a:ext cx="360996" cy="477054"/>
+          </a:xfrm>
+          <a:prstGeom prst="rect">
+            <a:avLst/>
+          </a:prstGeom>
+          <a:noFill/>
+        </p:spPr>
+        <p:txBody>
+          <a:bodyPr wrap="none" rtlCol="0">
+            <a:spAutoFit/>
+          </a:bodyPr>
+          <a:lstStyle/>
+          <a:p>
+            <a:r>
+              <a:rPr lang="en-US" altLang="ko-KR" sz="2500" dirty="0"/>
+              <a:t>5</a:t>
+            </a:r>
+            <a:endParaRPr lang="ko-KR" altLang="en-US" sz="2500" dirty="0"/>
+          </a:p>
+        </p:txBody>
+      </p:sp>
+      <p:sp>
+        <p:nvSpPr>
+          <p:cNvPr id="57" name="TextBox 56">
+            <a:extLst>
+              <a:ext uri="{FF2B5EF4-FFF2-40B4-BE49-F238E27FC236}">
+                <a16:creationId xmlns:a16="http://schemas.microsoft.com/office/drawing/2014/main" id="{A53E2245-5351-4A84-8A19-CE2CE445E2D6}"/>
+              </a:ext>
+            </a:extLst>
+          </p:cNvPr>
+          <p:cNvSpPr txBox="1"/>
+          <p:nvPr/>
+        </p:nvSpPr>
+        <p:spPr>
+          <a:xfrm>
+            <a:off x="2262311" y="3998368"/>
+            <a:ext cx="360996" cy="477054"/>
+          </a:xfrm>
+          <a:prstGeom prst="rect">
+            <a:avLst/>
+          </a:prstGeom>
+          <a:noFill/>
+        </p:spPr>
+        <p:txBody>
+          <a:bodyPr wrap="none" rtlCol="0">
+            <a:spAutoFit/>
+          </a:bodyPr>
+          <a:lstStyle/>
+          <a:p>
+            <a:r>
+              <a:rPr lang="en-US" altLang="ko-KR" sz="2500" dirty="0"/>
+              <a:t>3</a:t>
+            </a:r>
+            <a:endParaRPr lang="ko-KR" altLang="en-US" sz="2500" dirty="0"/>
+          </a:p>
+        </p:txBody>
+      </p:sp>
+      <p:sp>
+        <p:nvSpPr>
+          <p:cNvPr id="58" name="TextBox 57">
+            <a:extLst>
+              <a:ext uri="{FF2B5EF4-FFF2-40B4-BE49-F238E27FC236}">
+                <a16:creationId xmlns:a16="http://schemas.microsoft.com/office/drawing/2014/main" id="{010463DF-BFDC-4853-A210-C9CD2EA7A267}"/>
+              </a:ext>
+            </a:extLst>
+          </p:cNvPr>
+          <p:cNvSpPr txBox="1"/>
+          <p:nvPr/>
+        </p:nvSpPr>
+        <p:spPr>
+          <a:xfrm>
+            <a:off x="3674342" y="4612348"/>
+            <a:ext cx="558166" cy="861774"/>
+          </a:xfrm>
+          <a:prstGeom prst="rect">
+            <a:avLst/>
+          </a:prstGeom>
+          <a:noFill/>
+        </p:spPr>
+        <p:txBody>
+          <a:bodyPr wrap="none" rtlCol="0">
+            <a:spAutoFit/>
+          </a:bodyPr>
+          <a:lstStyle/>
+          <a:p>
+            <a:r>
+              <a:rPr lang="en-US" altLang="ko-KR" sz="5000" dirty="0"/>
+              <a:t>B</a:t>
+            </a:r>
+            <a:endParaRPr lang="ko-KR" altLang="en-US" sz="5000" dirty="0"/>
+          </a:p>
+        </p:txBody>
+      </p:sp>
+      <p:sp>
+        <p:nvSpPr>
+          <p:cNvPr id="59" name="TextBox 58">
+            <a:extLst>
+              <a:ext uri="{FF2B5EF4-FFF2-40B4-BE49-F238E27FC236}">
+                <a16:creationId xmlns:a16="http://schemas.microsoft.com/office/drawing/2014/main" id="{3EA2D1B6-C9AB-44F2-8CCE-C8F15F971410}"/>
+              </a:ext>
+            </a:extLst>
+          </p:cNvPr>
+          <p:cNvSpPr txBox="1"/>
+          <p:nvPr/>
+        </p:nvSpPr>
+        <p:spPr>
+          <a:xfrm>
+            <a:off x="3635925" y="5461119"/>
+            <a:ext cx="606256" cy="861774"/>
+          </a:xfrm>
+          <a:prstGeom prst="rect">
+            <a:avLst/>
+          </a:prstGeom>
+          <a:noFill/>
+        </p:spPr>
+        <p:txBody>
+          <a:bodyPr wrap="none" rtlCol="0">
+            <a:spAutoFit/>
+          </a:bodyPr>
+          <a:lstStyle/>
+          <a:p>
+            <a:r>
+              <a:rPr lang="en-US" altLang="ko-KR" sz="5000" dirty="0"/>
+              <a:t>C</a:t>
+            </a:r>
+            <a:endParaRPr lang="ko-KR" altLang="en-US" sz="5000" dirty="0"/>
+          </a:p>
+        </p:txBody>
+      </p:sp>
+      <p:cxnSp>
+        <p:nvCxnSpPr>
+          <p:cNvPr id="11" name="직선 연결선 10">
+            <a:extLst>
+              <a:ext uri="{FF2B5EF4-FFF2-40B4-BE49-F238E27FC236}">
+                <a16:creationId xmlns:a16="http://schemas.microsoft.com/office/drawing/2014/main" id="{62356E44-86B6-4AAC-BACC-7A6E6C3F7CA8}"/>
+              </a:ext>
+            </a:extLst>
+          </p:cNvPr>
+          <p:cNvCxnSpPr>
+            <a:cxnSpLocks/>
+            <a:stCxn id="9" idx="0"/>
+            <a:endCxn id="9" idx="2"/>
+          </p:cNvCxnSpPr>
+          <p:nvPr/>
+        </p:nvCxnSpPr>
+        <p:spPr>
+          <a:xfrm>
+            <a:off x="3902625" y="793604"/>
+            <a:ext cx="0" cy="858653"/>
+          </a:xfrm>
+          <a:prstGeom prst="line">
+            <a:avLst/>
+          </a:prstGeom>
+        </p:spPr>
+        <p:style>
+          <a:lnRef idx="1">
+            <a:schemeClr val="dk1"/>
+          </a:lnRef>
+          <a:fillRef idx="0">
+            <a:schemeClr val="dk1"/>
+          </a:fillRef>
+          <a:effectRef idx="0">
+            <a:schemeClr val="dk1"/>
+          </a:effectRef>
+          <a:fontRef idx="minor">
+            <a:schemeClr val="tx1"/>
+          </a:fontRef>
+        </p:style>
+      </p:cxnSp>
+      <p:sp>
+        <p:nvSpPr>
+          <p:cNvPr id="61" name="TextBox 60">
+            <a:extLst>
+              <a:ext uri="{FF2B5EF4-FFF2-40B4-BE49-F238E27FC236}">
+                <a16:creationId xmlns:a16="http://schemas.microsoft.com/office/drawing/2014/main" id="{575380EC-D2A2-4EEC-8A5E-7385F6FC86DB}"/>
+              </a:ext>
+            </a:extLst>
+          </p:cNvPr>
+          <p:cNvSpPr txBox="1"/>
+          <p:nvPr/>
+        </p:nvSpPr>
+        <p:spPr>
+          <a:xfrm>
+            <a:off x="2530953" y="248068"/>
+            <a:ext cx="980625" cy="477054"/>
+          </a:xfrm>
+          <a:prstGeom prst="rect">
+            <a:avLst/>
+          </a:prstGeom>
+          <a:noFill/>
+        </p:spPr>
+        <p:txBody>
+          <a:bodyPr wrap="square" rtlCol="0">
+            <a:spAutoFit/>
+          </a:bodyPr>
+          <a:lstStyle/>
+          <a:p>
+            <a:r>
+              <a:rPr lang="en-US" altLang="ko-KR" sz="2500" dirty="0"/>
+              <a:t>Front</a:t>
+            </a:r>
+            <a:endParaRPr lang="ko-KR" altLang="en-US" sz="2500" dirty="0"/>
+          </a:p>
+        </p:txBody>
+      </p:sp>
+      <p:sp>
+        <p:nvSpPr>
+          <p:cNvPr id="62" name="TextBox 61">
+            <a:extLst>
+              <a:ext uri="{FF2B5EF4-FFF2-40B4-BE49-F238E27FC236}">
+                <a16:creationId xmlns:a16="http://schemas.microsoft.com/office/drawing/2014/main" id="{1069B8AF-3D75-40A2-AAED-5D98EE53CC77}"/>
+              </a:ext>
+            </a:extLst>
+          </p:cNvPr>
+          <p:cNvSpPr txBox="1"/>
+          <p:nvPr/>
+        </p:nvSpPr>
+        <p:spPr>
+          <a:xfrm>
+            <a:off x="4386011" y="268629"/>
+            <a:ext cx="822597" cy="477054"/>
+          </a:xfrm>
+          <a:prstGeom prst="rect">
+            <a:avLst/>
+          </a:prstGeom>
+          <a:noFill/>
+        </p:spPr>
+        <p:txBody>
+          <a:bodyPr wrap="none" rtlCol="0">
+            <a:spAutoFit/>
+          </a:bodyPr>
+          <a:lstStyle/>
+          <a:p>
+            <a:r>
+              <a:rPr lang="en-US" altLang="ko-KR" sz="2500" dirty="0"/>
+              <a:t>Rear</a:t>
+            </a:r>
+            <a:endParaRPr lang="ko-KR" altLang="en-US" sz="2500" dirty="0"/>
+          </a:p>
+        </p:txBody>
+      </p:sp>
+      <p:sp>
+        <p:nvSpPr>
+          <p:cNvPr id="63" name="TextBox 62">
+            <a:extLst>
+              <a:ext uri="{FF2B5EF4-FFF2-40B4-BE49-F238E27FC236}">
+                <a16:creationId xmlns:a16="http://schemas.microsoft.com/office/drawing/2014/main" id="{6D031FA4-E416-412F-9CD1-3946842C8840}"/>
+              </a:ext>
+            </a:extLst>
+          </p:cNvPr>
+          <p:cNvSpPr txBox="1"/>
+          <p:nvPr/>
+        </p:nvSpPr>
+        <p:spPr>
+          <a:xfrm>
+            <a:off x="2752603" y="782535"/>
+            <a:ext cx="537327" cy="861774"/>
+          </a:xfrm>
+          <a:prstGeom prst="rect">
+            <a:avLst/>
+          </a:prstGeom>
+          <a:noFill/>
+        </p:spPr>
+        <p:txBody>
+          <a:bodyPr wrap="none" rtlCol="0">
+            <a:spAutoFit/>
+          </a:bodyPr>
+          <a:lstStyle/>
+          <a:p>
+            <a:r>
+              <a:rPr lang="en-US" altLang="ko-KR" sz="5000" dirty="0"/>
+              <a:t>3</a:t>
+            </a:r>
+            <a:endParaRPr lang="ko-KR" altLang="en-US" sz="5000" dirty="0"/>
+          </a:p>
+        </p:txBody>
+      </p:sp>
+      <p:sp>
+        <p:nvSpPr>
+          <p:cNvPr id="64" name="TextBox 63">
+            <a:extLst>
+              <a:ext uri="{FF2B5EF4-FFF2-40B4-BE49-F238E27FC236}">
+                <a16:creationId xmlns:a16="http://schemas.microsoft.com/office/drawing/2014/main" id="{CEB07D1F-B3AC-4FC0-B081-55F1460CF976}"/>
+              </a:ext>
+            </a:extLst>
+          </p:cNvPr>
+          <p:cNvSpPr txBox="1"/>
+          <p:nvPr/>
+        </p:nvSpPr>
+        <p:spPr>
+          <a:xfrm>
+            <a:off x="4508325" y="789758"/>
+            <a:ext cx="537327" cy="861774"/>
+          </a:xfrm>
+          <a:prstGeom prst="rect">
+            <a:avLst/>
+          </a:prstGeom>
+          <a:noFill/>
+        </p:spPr>
+        <p:txBody>
+          <a:bodyPr wrap="none" rtlCol="0">
+            <a:spAutoFit/>
+          </a:bodyPr>
+          <a:lstStyle/>
+          <a:p>
+            <a:r>
+              <a:rPr lang="en-US" altLang="ko-KR" sz="5000" dirty="0"/>
+              <a:t>5</a:t>
+            </a:r>
+            <a:endParaRPr lang="ko-KR" altLang="en-US" sz="5000" dirty="0"/>
+          </a:p>
+        </p:txBody>
+      </p:sp>
+      <p:sp>
+        <p:nvSpPr>
+          <p:cNvPr id="65" name="직사각형 64">
+            <a:extLst>
+              <a:ext uri="{FF2B5EF4-FFF2-40B4-BE49-F238E27FC236}">
+                <a16:creationId xmlns:a16="http://schemas.microsoft.com/office/drawing/2014/main" id="{51BBCA6C-0314-4E11-BA47-11DFCC531825}"/>
+              </a:ext>
+            </a:extLst>
+          </p:cNvPr>
+          <p:cNvSpPr/>
+          <p:nvPr/>
+        </p:nvSpPr>
+        <p:spPr>
+          <a:xfrm>
+            <a:off x="7497664" y="2245307"/>
+            <a:ext cx="2283681" cy="4041059"/>
+          </a:xfrm>
+          <a:prstGeom prst="rect">
+            <a:avLst/>
+          </a:prstGeom>
+        </p:spPr>
+        <p:style>
+          <a:lnRef idx="2">
+            <a:schemeClr val="dk1"/>
+          </a:lnRef>
+          <a:fillRef idx="1">
+            <a:schemeClr val="lt1"/>
+          </a:fillRef>
+          <a:effectRef idx="0">
+            <a:schemeClr val="dk1"/>
+          </a:effectRef>
+          <a:fontRef idx="minor">
+            <a:schemeClr val="dk1"/>
+          </a:fontRef>
+        </p:style>
+        <p:txBody>
+          <a:bodyPr rtlCol="0" anchor="ctr"/>
+          <a:lstStyle/>
+          <a:p>
+            <a:pPr algn="ctr"/>
+            <a:endParaRPr lang="ko-KR" altLang="en-US"/>
+          </a:p>
+        </p:txBody>
+      </p:sp>
+      <p:cxnSp>
+        <p:nvCxnSpPr>
+          <p:cNvPr id="66" name="직선 연결선 65">
+            <a:extLst>
+              <a:ext uri="{FF2B5EF4-FFF2-40B4-BE49-F238E27FC236}">
+                <a16:creationId xmlns:a16="http://schemas.microsoft.com/office/drawing/2014/main" id="{969F2566-4182-4F02-A049-C4FC24A16506}"/>
+              </a:ext>
+            </a:extLst>
+          </p:cNvPr>
+          <p:cNvCxnSpPr>
+            <a:cxnSpLocks/>
+          </p:cNvCxnSpPr>
+          <p:nvPr/>
+        </p:nvCxnSpPr>
+        <p:spPr>
+          <a:xfrm>
+            <a:off x="7497664" y="3031887"/>
+            <a:ext cx="2272030" cy="0"/>
+          </a:xfrm>
+          <a:prstGeom prst="line">
+            <a:avLst/>
+          </a:prstGeom>
+        </p:spPr>
+        <p:style>
+          <a:lnRef idx="1">
+            <a:schemeClr val="dk1"/>
+          </a:lnRef>
+          <a:fillRef idx="0">
+            <a:schemeClr val="dk1"/>
+          </a:fillRef>
+          <a:effectRef idx="0">
+            <a:schemeClr val="dk1"/>
+          </a:effectRef>
+          <a:fontRef idx="minor">
+            <a:schemeClr val="tx1"/>
+          </a:fontRef>
+        </p:style>
+      </p:cxnSp>
+      <p:cxnSp>
+        <p:nvCxnSpPr>
+          <p:cNvPr id="67" name="직선 연결선 66">
+            <a:extLst>
+              <a:ext uri="{FF2B5EF4-FFF2-40B4-BE49-F238E27FC236}">
+                <a16:creationId xmlns:a16="http://schemas.microsoft.com/office/drawing/2014/main" id="{7BA8E1D2-5685-4D2B-8138-3D519389E733}"/>
+              </a:ext>
+            </a:extLst>
+          </p:cNvPr>
+          <p:cNvCxnSpPr>
+            <a:cxnSpLocks/>
+          </p:cNvCxnSpPr>
+          <p:nvPr/>
+        </p:nvCxnSpPr>
+        <p:spPr>
+          <a:xfrm>
+            <a:off x="7497664" y="3818467"/>
+            <a:ext cx="2272030" cy="0"/>
+          </a:xfrm>
+          <a:prstGeom prst="line">
+            <a:avLst/>
+          </a:prstGeom>
+        </p:spPr>
+        <p:style>
+          <a:lnRef idx="1">
+            <a:schemeClr val="dk1"/>
+          </a:lnRef>
+          <a:fillRef idx="0">
+            <a:schemeClr val="dk1"/>
+          </a:fillRef>
+          <a:effectRef idx="0">
+            <a:schemeClr val="dk1"/>
+          </a:effectRef>
+          <a:fontRef idx="minor">
+            <a:schemeClr val="tx1"/>
+          </a:fontRef>
+        </p:style>
+      </p:cxnSp>
+      <p:cxnSp>
+        <p:nvCxnSpPr>
+          <p:cNvPr id="68" name="직선 연결선 67">
+            <a:extLst>
+              <a:ext uri="{FF2B5EF4-FFF2-40B4-BE49-F238E27FC236}">
+                <a16:creationId xmlns:a16="http://schemas.microsoft.com/office/drawing/2014/main" id="{9B40127C-A1B6-4930-8C57-B00AB8EE661D}"/>
+              </a:ext>
+            </a:extLst>
+          </p:cNvPr>
+          <p:cNvCxnSpPr>
+            <a:cxnSpLocks/>
+          </p:cNvCxnSpPr>
+          <p:nvPr/>
+        </p:nvCxnSpPr>
+        <p:spPr>
+          <a:xfrm>
+            <a:off x="7485374" y="4585384"/>
+            <a:ext cx="2272030" cy="0"/>
+          </a:xfrm>
+          <a:prstGeom prst="line">
+            <a:avLst/>
+          </a:prstGeom>
+        </p:spPr>
+        <p:style>
+          <a:lnRef idx="1">
+            <a:schemeClr val="dk1"/>
+          </a:lnRef>
+          <a:fillRef idx="0">
+            <a:schemeClr val="dk1"/>
+          </a:fillRef>
+          <a:effectRef idx="0">
+            <a:schemeClr val="dk1"/>
+          </a:effectRef>
+          <a:fontRef idx="minor">
+            <a:schemeClr val="tx1"/>
+          </a:fontRef>
+        </p:style>
+      </p:cxnSp>
+      <p:cxnSp>
+        <p:nvCxnSpPr>
+          <p:cNvPr id="69" name="직선 연결선 68">
+            <a:extLst>
+              <a:ext uri="{FF2B5EF4-FFF2-40B4-BE49-F238E27FC236}">
+                <a16:creationId xmlns:a16="http://schemas.microsoft.com/office/drawing/2014/main" id="{86D001E8-9488-42B3-A743-47765D7C1F13}"/>
+              </a:ext>
+            </a:extLst>
+          </p:cNvPr>
+          <p:cNvCxnSpPr>
+            <a:cxnSpLocks/>
+          </p:cNvCxnSpPr>
+          <p:nvPr/>
+        </p:nvCxnSpPr>
+        <p:spPr>
+          <a:xfrm>
+            <a:off x="7485374" y="5426041"/>
+            <a:ext cx="2272030" cy="0"/>
+          </a:xfrm>
+          <a:prstGeom prst="line">
+            <a:avLst/>
+          </a:prstGeom>
+        </p:spPr>
+        <p:style>
+          <a:lnRef idx="1">
+            <a:schemeClr val="dk1"/>
+          </a:lnRef>
+          <a:fillRef idx="0">
+            <a:schemeClr val="dk1"/>
+          </a:fillRef>
+          <a:effectRef idx="0">
+            <a:schemeClr val="dk1"/>
+          </a:effectRef>
+          <a:fontRef idx="minor">
+            <a:schemeClr val="tx1"/>
+          </a:fontRef>
+        </p:style>
+      </p:cxnSp>
+      <p:sp>
+        <p:nvSpPr>
+          <p:cNvPr id="70" name="TextBox 69">
+            <a:extLst>
+              <a:ext uri="{FF2B5EF4-FFF2-40B4-BE49-F238E27FC236}">
+                <a16:creationId xmlns:a16="http://schemas.microsoft.com/office/drawing/2014/main" id="{31DD8ECD-50C8-4130-BFEA-834AAD2F85F0}"/>
+              </a:ext>
+            </a:extLst>
+          </p:cNvPr>
+          <p:cNvSpPr txBox="1"/>
+          <p:nvPr/>
+        </p:nvSpPr>
+        <p:spPr>
+          <a:xfrm>
+            <a:off x="8342073" y="3772292"/>
+            <a:ext cx="591829" cy="861774"/>
+          </a:xfrm>
+          <a:prstGeom prst="rect">
+            <a:avLst/>
+          </a:prstGeom>
+          <a:noFill/>
+        </p:spPr>
+        <p:txBody>
+          <a:bodyPr wrap="none" rtlCol="0">
+            <a:spAutoFit/>
+          </a:bodyPr>
+          <a:lstStyle/>
+          <a:p>
+            <a:r>
+              <a:rPr lang="en-US" altLang="ko-KR" sz="5000" dirty="0"/>
+              <a:t>C</a:t>
+            </a:r>
+            <a:endParaRPr lang="ko-KR" altLang="en-US" sz="5000" dirty="0"/>
+          </a:p>
+        </p:txBody>
+      </p:sp>
+      <p:sp>
+        <p:nvSpPr>
+          <p:cNvPr id="71" name="TextBox 70">
+            <a:extLst>
+              <a:ext uri="{FF2B5EF4-FFF2-40B4-BE49-F238E27FC236}">
+                <a16:creationId xmlns:a16="http://schemas.microsoft.com/office/drawing/2014/main" id="{85F2816D-0C96-4F08-A4EB-29CEB5C64FB0}"/>
+              </a:ext>
+            </a:extLst>
+          </p:cNvPr>
+          <p:cNvSpPr txBox="1"/>
+          <p:nvPr/>
+        </p:nvSpPr>
+        <p:spPr>
+          <a:xfrm>
+            <a:off x="6950025" y="2416436"/>
+            <a:ext cx="360996" cy="477054"/>
+          </a:xfrm>
+          <a:prstGeom prst="rect">
+            <a:avLst/>
+          </a:prstGeom>
+          <a:noFill/>
+        </p:spPr>
+        <p:txBody>
+          <a:bodyPr wrap="none" rtlCol="0">
+            <a:spAutoFit/>
+          </a:bodyPr>
+          <a:lstStyle/>
+          <a:p>
+            <a:r>
+              <a:rPr lang="en-US" altLang="ko-KR" sz="2500" dirty="0"/>
+              <a:t>1</a:t>
+            </a:r>
+            <a:endParaRPr lang="ko-KR" altLang="en-US" sz="2500" dirty="0"/>
+          </a:p>
+        </p:txBody>
+      </p:sp>
+      <p:sp>
+        <p:nvSpPr>
+          <p:cNvPr id="73" name="TextBox 72">
+            <a:extLst>
+              <a:ext uri="{FF2B5EF4-FFF2-40B4-BE49-F238E27FC236}">
+                <a16:creationId xmlns:a16="http://schemas.microsoft.com/office/drawing/2014/main" id="{6D369031-2B64-4F13-BA73-C21A7D9B5091}"/>
+              </a:ext>
+            </a:extLst>
+          </p:cNvPr>
+          <p:cNvSpPr txBox="1"/>
+          <p:nvPr/>
+        </p:nvSpPr>
+        <p:spPr>
+          <a:xfrm>
+            <a:off x="6950025" y="3217016"/>
+            <a:ext cx="360996" cy="477054"/>
+          </a:xfrm>
+          <a:prstGeom prst="rect">
+            <a:avLst/>
+          </a:prstGeom>
+          <a:noFill/>
+        </p:spPr>
+        <p:txBody>
+          <a:bodyPr wrap="none" rtlCol="0">
+            <a:spAutoFit/>
+          </a:bodyPr>
+          <a:lstStyle/>
+          <a:p>
+            <a:r>
+              <a:rPr lang="en-US" altLang="ko-KR" sz="2500" dirty="0"/>
+              <a:t>2</a:t>
+            </a:r>
+            <a:endParaRPr lang="ko-KR" altLang="en-US" sz="2500" dirty="0"/>
+          </a:p>
+        </p:txBody>
+      </p:sp>
+      <p:sp>
+        <p:nvSpPr>
+          <p:cNvPr id="74" name="TextBox 73">
+            <a:extLst>
+              <a:ext uri="{FF2B5EF4-FFF2-40B4-BE49-F238E27FC236}">
+                <a16:creationId xmlns:a16="http://schemas.microsoft.com/office/drawing/2014/main" id="{5BF84026-D944-4875-AF41-6354A4ABF6E2}"/>
+              </a:ext>
+            </a:extLst>
+          </p:cNvPr>
+          <p:cNvSpPr txBox="1"/>
+          <p:nvPr/>
+        </p:nvSpPr>
+        <p:spPr>
+          <a:xfrm>
+            <a:off x="6962453" y="4744875"/>
+            <a:ext cx="360996" cy="477054"/>
+          </a:xfrm>
+          <a:prstGeom prst="rect">
+            <a:avLst/>
+          </a:prstGeom>
+          <a:noFill/>
+        </p:spPr>
+        <p:txBody>
+          <a:bodyPr wrap="none" rtlCol="0">
+            <a:spAutoFit/>
+          </a:bodyPr>
+          <a:lstStyle/>
+          <a:p>
+            <a:r>
+              <a:rPr lang="en-US" altLang="ko-KR" sz="2500" dirty="0"/>
+              <a:t>4</a:t>
+            </a:r>
+            <a:endParaRPr lang="ko-KR" altLang="en-US" sz="2500" dirty="0"/>
+          </a:p>
+        </p:txBody>
+      </p:sp>
+      <p:sp>
+        <p:nvSpPr>
+          <p:cNvPr id="75" name="TextBox 74">
+            <a:extLst>
+              <a:ext uri="{FF2B5EF4-FFF2-40B4-BE49-F238E27FC236}">
+                <a16:creationId xmlns:a16="http://schemas.microsoft.com/office/drawing/2014/main" id="{AD33C10F-377D-43B2-9F71-6B194DCA67D2}"/>
+              </a:ext>
+            </a:extLst>
+          </p:cNvPr>
+          <p:cNvSpPr txBox="1"/>
+          <p:nvPr/>
+        </p:nvSpPr>
+        <p:spPr>
+          <a:xfrm>
+            <a:off x="6962453" y="5603330"/>
+            <a:ext cx="360996" cy="477054"/>
+          </a:xfrm>
+          <a:prstGeom prst="rect">
+            <a:avLst/>
+          </a:prstGeom>
+          <a:noFill/>
+        </p:spPr>
+        <p:txBody>
+          <a:bodyPr wrap="none" rtlCol="0">
+            <a:spAutoFit/>
+          </a:bodyPr>
+          <a:lstStyle/>
+          <a:p>
+            <a:r>
+              <a:rPr lang="en-US" altLang="ko-KR" sz="2500" dirty="0"/>
+              <a:t>5</a:t>
+            </a:r>
+            <a:endParaRPr lang="ko-KR" altLang="en-US" sz="2500" dirty="0"/>
+          </a:p>
+        </p:txBody>
+      </p:sp>
+      <p:sp>
+        <p:nvSpPr>
+          <p:cNvPr id="76" name="TextBox 75">
+            <a:extLst>
+              <a:ext uri="{FF2B5EF4-FFF2-40B4-BE49-F238E27FC236}">
+                <a16:creationId xmlns:a16="http://schemas.microsoft.com/office/drawing/2014/main" id="{C06C8984-B98F-444A-8476-D9D77F9DC052}"/>
+              </a:ext>
+            </a:extLst>
+          </p:cNvPr>
+          <p:cNvSpPr txBox="1"/>
+          <p:nvPr/>
+        </p:nvSpPr>
+        <p:spPr>
+          <a:xfrm>
+            <a:off x="6962453" y="3998368"/>
+            <a:ext cx="360996" cy="477054"/>
+          </a:xfrm>
+          <a:prstGeom prst="rect">
+            <a:avLst/>
+          </a:prstGeom>
+          <a:noFill/>
+        </p:spPr>
+        <p:txBody>
+          <a:bodyPr wrap="none" rtlCol="0">
+            <a:spAutoFit/>
+          </a:bodyPr>
+          <a:lstStyle/>
+          <a:p>
+            <a:r>
+              <a:rPr lang="en-US" altLang="ko-KR" sz="2500" dirty="0"/>
+              <a:t>3</a:t>
+            </a:r>
+            <a:endParaRPr lang="ko-KR" altLang="en-US" sz="2500" dirty="0"/>
+          </a:p>
+        </p:txBody>
+      </p:sp>
+      <p:sp>
+        <p:nvSpPr>
+          <p:cNvPr id="77" name="TextBox 76">
+            <a:extLst>
+              <a:ext uri="{FF2B5EF4-FFF2-40B4-BE49-F238E27FC236}">
+                <a16:creationId xmlns:a16="http://schemas.microsoft.com/office/drawing/2014/main" id="{7D48B1A4-C8C4-4848-9122-0678CF3EF98A}"/>
+              </a:ext>
+            </a:extLst>
+          </p:cNvPr>
+          <p:cNvSpPr txBox="1"/>
+          <p:nvPr/>
+        </p:nvSpPr>
+        <p:spPr>
+          <a:xfrm>
+            <a:off x="8353073" y="2240635"/>
+            <a:ext cx="606256" cy="861774"/>
+          </a:xfrm>
+          <a:prstGeom prst="rect">
+            <a:avLst/>
+          </a:prstGeom>
+          <a:noFill/>
+        </p:spPr>
+        <p:txBody>
+          <a:bodyPr wrap="none" rtlCol="0">
+            <a:spAutoFit/>
+          </a:bodyPr>
+          <a:lstStyle/>
+          <a:p>
+            <a:r>
+              <a:rPr lang="en-US" altLang="ko-KR" sz="5000" dirty="0"/>
+              <a:t>A</a:t>
+            </a:r>
+            <a:endParaRPr lang="ko-KR" altLang="en-US" sz="5000" dirty="0"/>
+          </a:p>
+        </p:txBody>
+      </p:sp>
+      <p:sp>
+        <p:nvSpPr>
+          <p:cNvPr id="78" name="TextBox 77">
+            <a:extLst>
+              <a:ext uri="{FF2B5EF4-FFF2-40B4-BE49-F238E27FC236}">
+                <a16:creationId xmlns:a16="http://schemas.microsoft.com/office/drawing/2014/main" id="{E792EAF4-5FFC-492D-86B6-AFCA3170CD8B}"/>
+              </a:ext>
+            </a:extLst>
+          </p:cNvPr>
+          <p:cNvSpPr txBox="1"/>
+          <p:nvPr/>
+        </p:nvSpPr>
+        <p:spPr>
+          <a:xfrm>
+            <a:off x="8375736" y="2988863"/>
+            <a:ext cx="558166" cy="861774"/>
+          </a:xfrm>
+          <a:prstGeom prst="rect">
+            <a:avLst/>
+          </a:prstGeom>
+          <a:noFill/>
+        </p:spPr>
+        <p:txBody>
+          <a:bodyPr wrap="none" rtlCol="0">
+            <a:spAutoFit/>
+          </a:bodyPr>
+          <a:lstStyle/>
+          <a:p>
+            <a:r>
+              <a:rPr lang="en-US" altLang="ko-KR" sz="5000" dirty="0"/>
+              <a:t>B</a:t>
+            </a:r>
+            <a:endParaRPr lang="ko-KR" altLang="en-US" sz="5000" dirty="0"/>
+          </a:p>
+        </p:txBody>
+      </p:sp>
+      <p:sp>
+        <p:nvSpPr>
+          <p:cNvPr id="103" name="직사각형 102">
+            <a:extLst>
+              <a:ext uri="{FF2B5EF4-FFF2-40B4-BE49-F238E27FC236}">
+                <a16:creationId xmlns:a16="http://schemas.microsoft.com/office/drawing/2014/main" id="{10D7B2A2-1833-4009-A700-ACFD7014FBB9}"/>
+              </a:ext>
+            </a:extLst>
+          </p:cNvPr>
+          <p:cNvSpPr/>
+          <p:nvPr/>
+        </p:nvSpPr>
+        <p:spPr>
+          <a:xfrm>
+            <a:off x="6930629" y="793604"/>
+            <a:ext cx="3451143" cy="858653"/>
+          </a:xfrm>
+          <a:prstGeom prst="rect">
+            <a:avLst/>
+          </a:prstGeom>
+          <a:noFill/>
+          <a:ln>
+            <a:solidFill>
+              <a:schemeClr val="tx1"/>
+            </a:solidFill>
+          </a:ln>
+        </p:spPr>
+        <p:style>
+          <a:lnRef idx="2">
+            <a:schemeClr val="accent1">
+              <a:shade val="50000"/>
+            </a:schemeClr>
+          </a:lnRef>
+          <a:fillRef idx="1">
+            <a:schemeClr val="accent1"/>
+          </a:fillRef>
+          <a:effectRef idx="0">
+            <a:schemeClr val="accent1"/>
+          </a:effectRef>
+          <a:fontRef idx="minor">
+            <a:schemeClr val="lt1"/>
+          </a:fontRef>
+        </p:style>
+        <p:txBody>
+          <a:bodyPr rtlCol="0" anchor="ctr"/>
+          <a:lstStyle/>
+          <a:p>
+            <a:pPr algn="ctr"/>
+            <a:endParaRPr lang="ko-KR" altLang="en-US"/>
+          </a:p>
+        </p:txBody>
+      </p:sp>
+      <p:cxnSp>
+        <p:nvCxnSpPr>
+          <p:cNvPr id="104" name="직선 연결선 103">
+            <a:extLst>
+              <a:ext uri="{FF2B5EF4-FFF2-40B4-BE49-F238E27FC236}">
+                <a16:creationId xmlns:a16="http://schemas.microsoft.com/office/drawing/2014/main" id="{69C19752-EE24-434A-BA94-AE56D12C4FA4}"/>
+              </a:ext>
+            </a:extLst>
+          </p:cNvPr>
+          <p:cNvCxnSpPr>
+            <a:cxnSpLocks/>
+            <a:stCxn id="103" idx="0"/>
+            <a:endCxn id="103" idx="2"/>
+          </p:cNvCxnSpPr>
+          <p:nvPr/>
+        </p:nvCxnSpPr>
+        <p:spPr>
+          <a:xfrm>
+            <a:off x="8656201" y="793604"/>
+            <a:ext cx="0" cy="858653"/>
+          </a:xfrm>
+          <a:prstGeom prst="line">
+            <a:avLst/>
+          </a:prstGeom>
+        </p:spPr>
+        <p:style>
+          <a:lnRef idx="1">
+            <a:schemeClr val="dk1"/>
+          </a:lnRef>
+          <a:fillRef idx="0">
+            <a:schemeClr val="dk1"/>
+          </a:fillRef>
+          <a:effectRef idx="0">
+            <a:schemeClr val="dk1"/>
+          </a:effectRef>
+          <a:fontRef idx="minor">
+            <a:schemeClr val="tx1"/>
+          </a:fontRef>
+        </p:style>
+      </p:cxnSp>
+      <p:sp>
+        <p:nvSpPr>
+          <p:cNvPr id="105" name="TextBox 104">
+            <a:extLst>
+              <a:ext uri="{FF2B5EF4-FFF2-40B4-BE49-F238E27FC236}">
+                <a16:creationId xmlns:a16="http://schemas.microsoft.com/office/drawing/2014/main" id="{A91E0AB8-C555-445D-8A14-922B3B6011D8}"/>
+              </a:ext>
+            </a:extLst>
+          </p:cNvPr>
+          <p:cNvSpPr txBox="1"/>
+          <p:nvPr/>
+        </p:nvSpPr>
+        <p:spPr>
+          <a:xfrm>
+            <a:off x="7284531" y="248068"/>
+            <a:ext cx="980621" cy="477054"/>
+          </a:xfrm>
+          <a:prstGeom prst="rect">
+            <a:avLst/>
+          </a:prstGeom>
+          <a:noFill/>
+        </p:spPr>
+        <p:txBody>
+          <a:bodyPr wrap="square" rtlCol="0">
+            <a:spAutoFit/>
+          </a:bodyPr>
+          <a:lstStyle/>
+          <a:p>
+            <a:r>
+              <a:rPr lang="en-US" altLang="ko-KR" sz="2500" dirty="0"/>
+              <a:t>Front</a:t>
+            </a:r>
+            <a:endParaRPr lang="ko-KR" altLang="en-US" sz="2500" dirty="0"/>
+          </a:p>
+        </p:txBody>
+      </p:sp>
+      <p:sp>
+        <p:nvSpPr>
+          <p:cNvPr id="106" name="TextBox 105">
+            <a:extLst>
+              <a:ext uri="{FF2B5EF4-FFF2-40B4-BE49-F238E27FC236}">
+                <a16:creationId xmlns:a16="http://schemas.microsoft.com/office/drawing/2014/main" id="{0826FEAB-ECF2-4FE9-8348-78CEC490D84C}"/>
+              </a:ext>
+            </a:extLst>
+          </p:cNvPr>
+          <p:cNvSpPr txBox="1"/>
+          <p:nvPr/>
+        </p:nvSpPr>
+        <p:spPr>
+          <a:xfrm>
+            <a:off x="9086859" y="279720"/>
+            <a:ext cx="822597" cy="477054"/>
+          </a:xfrm>
+          <a:prstGeom prst="rect">
+            <a:avLst/>
+          </a:prstGeom>
+          <a:noFill/>
+        </p:spPr>
+        <p:txBody>
+          <a:bodyPr wrap="none" rtlCol="0">
+            <a:spAutoFit/>
+          </a:bodyPr>
+          <a:lstStyle/>
+          <a:p>
+            <a:r>
+              <a:rPr lang="en-US" altLang="ko-KR" sz="2500" dirty="0"/>
+              <a:t>Rear</a:t>
+            </a:r>
+            <a:endParaRPr lang="ko-KR" altLang="en-US" sz="2500" dirty="0"/>
+          </a:p>
+        </p:txBody>
+      </p:sp>
+      <p:sp>
+        <p:nvSpPr>
+          <p:cNvPr id="107" name="TextBox 106">
+            <a:extLst>
+              <a:ext uri="{FF2B5EF4-FFF2-40B4-BE49-F238E27FC236}">
+                <a16:creationId xmlns:a16="http://schemas.microsoft.com/office/drawing/2014/main" id="{6C6BB60A-DF01-4C87-BCF8-D5A8C1398225}"/>
+              </a:ext>
+            </a:extLst>
+          </p:cNvPr>
+          <p:cNvSpPr txBox="1"/>
+          <p:nvPr/>
+        </p:nvSpPr>
+        <p:spPr>
+          <a:xfrm>
+            <a:off x="7506179" y="782535"/>
+            <a:ext cx="537327" cy="861774"/>
+          </a:xfrm>
+          <a:prstGeom prst="rect">
+            <a:avLst/>
+          </a:prstGeom>
+          <a:noFill/>
+        </p:spPr>
+        <p:txBody>
+          <a:bodyPr wrap="none" rtlCol="0">
+            <a:spAutoFit/>
+          </a:bodyPr>
+          <a:lstStyle/>
+          <a:p>
+            <a:r>
+              <a:rPr lang="en-US" altLang="ko-KR" sz="5000" dirty="0"/>
+              <a:t>1</a:t>
+            </a:r>
+            <a:endParaRPr lang="ko-KR" altLang="en-US" sz="5000" dirty="0"/>
+          </a:p>
+        </p:txBody>
+      </p:sp>
+      <p:sp>
+        <p:nvSpPr>
+          <p:cNvPr id="108" name="TextBox 107">
+            <a:extLst>
+              <a:ext uri="{FF2B5EF4-FFF2-40B4-BE49-F238E27FC236}">
+                <a16:creationId xmlns:a16="http://schemas.microsoft.com/office/drawing/2014/main" id="{A2D54C62-5EF4-41FE-8A49-ABB08FEB3307}"/>
+              </a:ext>
+            </a:extLst>
+          </p:cNvPr>
+          <p:cNvSpPr txBox="1"/>
+          <p:nvPr/>
+        </p:nvSpPr>
+        <p:spPr>
+          <a:xfrm>
+            <a:off x="9229495" y="779924"/>
+            <a:ext cx="537327" cy="861774"/>
+          </a:xfrm>
+          <a:prstGeom prst="rect">
+            <a:avLst/>
+          </a:prstGeom>
+          <a:noFill/>
+        </p:spPr>
+        <p:txBody>
+          <a:bodyPr wrap="none" rtlCol="0">
+            <a:spAutoFit/>
+          </a:bodyPr>
+          <a:lstStyle/>
+          <a:p>
+            <a:r>
+              <a:rPr lang="en-US" altLang="ko-KR" sz="5000" dirty="0"/>
+              <a:t>3</a:t>
+            </a:r>
+            <a:endParaRPr lang="ko-KR" altLang="en-US" sz="5000" dirty="0"/>
+          </a:p>
+        </p:txBody>
+      </p:sp>
+    </p:spTree>
+    <p:extLst>
+      <p:ext uri="{BB962C8B-B14F-4D97-AF65-F5344CB8AC3E}">
+        <p14:creationId xmlns:p14="http://schemas.microsoft.com/office/powerpoint/2010/main" val="2271393677"/>
+      </p:ext>
+    </p:extLst>
+  </p:cSld>
+  <p:clrMapOvr>
+    <a:masterClrMapping/>
+  </p:clrMapOvr>
+</p:sld>
+</file>
+
+<file path=ppt/slides/slide5.xml><?xml version="1.0" encoding="utf-8"?>
+<p:sld xmlns:a="http://schemas.openxmlformats.org/drawingml/2006/main" xmlns:r="http://schemas.openxmlformats.org/officeDocument/2006/relationships" xmlns:p="http://schemas.openxmlformats.org/presentationml/2006/main">
+  <p:cSld>
+    <p:spTree>
+      <p:nvGrpSpPr>
+        <p:cNvPr id="1" name=""/>
+        <p:cNvGrpSpPr/>
+        <p:nvPr/>
+      </p:nvGrpSpPr>
+      <p:grpSpPr>
+        <a:xfrm>
+          <a:off x="0" y="0"/>
+          <a:ext cx="0" cy="0"/>
+          <a:chOff x="0" y="0"/>
+          <a:chExt cx="0" cy="0"/>
+        </a:xfrm>
+      </p:grpSpPr>
+      <p:sp>
+        <p:nvSpPr>
+          <p:cNvPr id="23" name="직사각형 22">
+            <a:extLst>
+              <a:ext uri="{FF2B5EF4-FFF2-40B4-BE49-F238E27FC236}">
+                <a16:creationId xmlns:a16="http://schemas.microsoft.com/office/drawing/2014/main" id="{3F4C1C6C-BD90-447D-8413-E68AD6047B56}"/>
+              </a:ext>
+            </a:extLst>
+          </p:cNvPr>
+          <p:cNvSpPr/>
+          <p:nvPr/>
+        </p:nvSpPr>
+        <p:spPr>
+          <a:xfrm>
+            <a:off x="2797522" y="2245307"/>
+            <a:ext cx="2283681" cy="4041059"/>
+          </a:xfrm>
+          <a:prstGeom prst="rect">
+            <a:avLst/>
+          </a:prstGeom>
+        </p:spPr>
+        <p:style>
+          <a:lnRef idx="2">
+            <a:schemeClr val="dk1"/>
+          </a:lnRef>
+          <a:fillRef idx="1">
+            <a:schemeClr val="lt1"/>
+          </a:fillRef>
+          <a:effectRef idx="0">
+            <a:schemeClr val="dk1"/>
+          </a:effectRef>
+          <a:fontRef idx="minor">
+            <a:schemeClr val="dk1"/>
+          </a:fontRef>
+        </p:style>
+        <p:txBody>
+          <a:bodyPr rtlCol="0" anchor="ctr"/>
+          <a:lstStyle/>
+          <a:p>
+            <a:pPr algn="ctr"/>
+            <a:endParaRPr lang="ko-KR" altLang="en-US"/>
+          </a:p>
+        </p:txBody>
+      </p:sp>
+      <p:cxnSp>
+        <p:nvCxnSpPr>
+          <p:cNvPr id="25" name="직선 연결선 24">
+            <a:extLst>
+              <a:ext uri="{FF2B5EF4-FFF2-40B4-BE49-F238E27FC236}">
+                <a16:creationId xmlns:a16="http://schemas.microsoft.com/office/drawing/2014/main" id="{36887506-3D3A-40F7-A0DF-147775B7B4CC}"/>
+              </a:ext>
+            </a:extLst>
+          </p:cNvPr>
+          <p:cNvCxnSpPr>
+            <a:cxnSpLocks/>
+          </p:cNvCxnSpPr>
+          <p:nvPr/>
+        </p:nvCxnSpPr>
+        <p:spPr>
+          <a:xfrm>
+            <a:off x="2797522" y="3031887"/>
+            <a:ext cx="2272030" cy="0"/>
+          </a:xfrm>
+          <a:prstGeom prst="line">
+            <a:avLst/>
+          </a:prstGeom>
+        </p:spPr>
+        <p:style>
+          <a:lnRef idx="1">
+            <a:schemeClr val="dk1"/>
+          </a:lnRef>
+          <a:fillRef idx="0">
+            <a:schemeClr val="dk1"/>
+          </a:fillRef>
+          <a:effectRef idx="0">
+            <a:schemeClr val="dk1"/>
+          </a:effectRef>
+          <a:fontRef idx="minor">
+            <a:schemeClr val="tx1"/>
+          </a:fontRef>
+        </p:style>
+      </p:cxnSp>
+      <p:cxnSp>
+        <p:nvCxnSpPr>
+          <p:cNvPr id="26" name="직선 연결선 25">
+            <a:extLst>
+              <a:ext uri="{FF2B5EF4-FFF2-40B4-BE49-F238E27FC236}">
+                <a16:creationId xmlns:a16="http://schemas.microsoft.com/office/drawing/2014/main" id="{EF29291C-834B-499E-AF94-E680B5418C5B}"/>
+              </a:ext>
+            </a:extLst>
+          </p:cNvPr>
+          <p:cNvCxnSpPr>
+            <a:cxnSpLocks/>
+          </p:cNvCxnSpPr>
+          <p:nvPr/>
+        </p:nvCxnSpPr>
+        <p:spPr>
+          <a:xfrm>
+            <a:off x="2797522" y="3818467"/>
+            <a:ext cx="2272030" cy="0"/>
+          </a:xfrm>
+          <a:prstGeom prst="line">
+            <a:avLst/>
+          </a:prstGeom>
+        </p:spPr>
+        <p:style>
+          <a:lnRef idx="1">
+            <a:schemeClr val="dk1"/>
+          </a:lnRef>
+          <a:fillRef idx="0">
+            <a:schemeClr val="dk1"/>
+          </a:fillRef>
+          <a:effectRef idx="0">
+            <a:schemeClr val="dk1"/>
+          </a:effectRef>
+          <a:fontRef idx="minor">
+            <a:schemeClr val="tx1"/>
+          </a:fontRef>
+        </p:style>
+      </p:cxnSp>
+      <p:cxnSp>
+        <p:nvCxnSpPr>
+          <p:cNvPr id="27" name="직선 연결선 26">
+            <a:extLst>
+              <a:ext uri="{FF2B5EF4-FFF2-40B4-BE49-F238E27FC236}">
+                <a16:creationId xmlns:a16="http://schemas.microsoft.com/office/drawing/2014/main" id="{EFF2AD76-92E8-4E23-8DC7-1131314C0C20}"/>
+              </a:ext>
+            </a:extLst>
+          </p:cNvPr>
+          <p:cNvCxnSpPr>
+            <a:cxnSpLocks/>
+          </p:cNvCxnSpPr>
+          <p:nvPr/>
+        </p:nvCxnSpPr>
+        <p:spPr>
+          <a:xfrm>
+            <a:off x="2785232" y="4585384"/>
+            <a:ext cx="2272030" cy="0"/>
+          </a:xfrm>
+          <a:prstGeom prst="line">
+            <a:avLst/>
+          </a:prstGeom>
+        </p:spPr>
+        <p:style>
+          <a:lnRef idx="1">
+            <a:schemeClr val="dk1"/>
+          </a:lnRef>
+          <a:fillRef idx="0">
+            <a:schemeClr val="dk1"/>
+          </a:fillRef>
+          <a:effectRef idx="0">
+            <a:schemeClr val="dk1"/>
+          </a:effectRef>
+          <a:fontRef idx="minor">
+            <a:schemeClr val="tx1"/>
+          </a:fontRef>
+        </p:style>
+      </p:cxnSp>
+      <p:cxnSp>
+        <p:nvCxnSpPr>
+          <p:cNvPr id="28" name="직선 연결선 27">
+            <a:extLst>
+              <a:ext uri="{FF2B5EF4-FFF2-40B4-BE49-F238E27FC236}">
+                <a16:creationId xmlns:a16="http://schemas.microsoft.com/office/drawing/2014/main" id="{CF6EB6D4-B905-4B91-B14C-FA7AD3167D3E}"/>
+              </a:ext>
+            </a:extLst>
+          </p:cNvPr>
+          <p:cNvCxnSpPr>
+            <a:cxnSpLocks/>
+          </p:cNvCxnSpPr>
+          <p:nvPr/>
+        </p:nvCxnSpPr>
+        <p:spPr>
+          <a:xfrm>
+            <a:off x="2785232" y="5426041"/>
+            <a:ext cx="2272030" cy="0"/>
+          </a:xfrm>
+          <a:prstGeom prst="line">
+            <a:avLst/>
+          </a:prstGeom>
+        </p:spPr>
+        <p:style>
+          <a:lnRef idx="1">
+            <a:schemeClr val="dk1"/>
+          </a:lnRef>
+          <a:fillRef idx="0">
+            <a:schemeClr val="dk1"/>
+          </a:fillRef>
+          <a:effectRef idx="0">
+            <a:schemeClr val="dk1"/>
+          </a:effectRef>
+          <a:fontRef idx="minor">
+            <a:schemeClr val="tx1"/>
+          </a:fontRef>
+        </p:style>
+      </p:cxnSp>
+      <p:sp>
+        <p:nvSpPr>
+          <p:cNvPr id="41" name="TextBox 40">
+            <a:extLst>
+              <a:ext uri="{FF2B5EF4-FFF2-40B4-BE49-F238E27FC236}">
+                <a16:creationId xmlns:a16="http://schemas.microsoft.com/office/drawing/2014/main" id="{22B6B0D3-B1D4-4F89-8A50-D3B1DE032F3C}"/>
+              </a:ext>
+            </a:extLst>
+          </p:cNvPr>
+          <p:cNvSpPr txBox="1"/>
+          <p:nvPr/>
+        </p:nvSpPr>
+        <p:spPr>
+          <a:xfrm>
+            <a:off x="3650297" y="3761133"/>
+            <a:ext cx="606256" cy="861774"/>
+          </a:xfrm>
+          <a:prstGeom prst="rect">
+            <a:avLst/>
+          </a:prstGeom>
+          <a:noFill/>
+        </p:spPr>
+        <p:txBody>
+          <a:bodyPr wrap="none" rtlCol="0">
+            <a:spAutoFit/>
+          </a:bodyPr>
+          <a:lstStyle/>
+          <a:p>
+            <a:r>
+              <a:rPr lang="en-US" altLang="ko-KR" sz="5000" dirty="0"/>
+              <a:t>A</a:t>
+            </a:r>
+            <a:endParaRPr lang="ko-KR" altLang="en-US" sz="5000" dirty="0"/>
+          </a:p>
+        </p:txBody>
+      </p:sp>
+      <p:sp>
+        <p:nvSpPr>
+          <p:cNvPr id="46" name="TextBox 45">
+            <a:extLst>
+              <a:ext uri="{FF2B5EF4-FFF2-40B4-BE49-F238E27FC236}">
+                <a16:creationId xmlns:a16="http://schemas.microsoft.com/office/drawing/2014/main" id="{5FAF1532-F3DD-4529-BA39-0488FD64897F}"/>
+              </a:ext>
+            </a:extLst>
+          </p:cNvPr>
+          <p:cNvSpPr txBox="1"/>
+          <p:nvPr/>
+        </p:nvSpPr>
+        <p:spPr>
+          <a:xfrm>
+            <a:off x="2249883" y="2416436"/>
+            <a:ext cx="360996" cy="477054"/>
+          </a:xfrm>
+          <a:prstGeom prst="rect">
+            <a:avLst/>
+          </a:prstGeom>
+          <a:noFill/>
+        </p:spPr>
+        <p:txBody>
+          <a:bodyPr wrap="none" rtlCol="0">
+            <a:spAutoFit/>
+          </a:bodyPr>
+          <a:lstStyle/>
+          <a:p>
+            <a:r>
+              <a:rPr lang="en-US" altLang="ko-KR" sz="2500" dirty="0"/>
+              <a:t>1</a:t>
+            </a:r>
+            <a:endParaRPr lang="ko-KR" altLang="en-US" sz="2500" dirty="0"/>
+          </a:p>
+        </p:txBody>
+      </p:sp>
+      <p:sp>
+        <p:nvSpPr>
+          <p:cNvPr id="9" name="직사각형 8">
+            <a:extLst>
+              <a:ext uri="{FF2B5EF4-FFF2-40B4-BE49-F238E27FC236}">
+                <a16:creationId xmlns:a16="http://schemas.microsoft.com/office/drawing/2014/main" id="{92BF9B99-DF8B-4CA8-A774-47620C0A237E}"/>
+              </a:ext>
+            </a:extLst>
+          </p:cNvPr>
+          <p:cNvSpPr/>
+          <p:nvPr/>
+        </p:nvSpPr>
+        <p:spPr>
+          <a:xfrm>
+            <a:off x="2177053" y="793604"/>
+            <a:ext cx="3451143" cy="858653"/>
+          </a:xfrm>
+          <a:prstGeom prst="rect">
+            <a:avLst/>
+          </a:prstGeom>
+          <a:noFill/>
+          <a:ln>
+            <a:solidFill>
+              <a:schemeClr val="tx1"/>
+            </a:solidFill>
+          </a:ln>
+        </p:spPr>
+        <p:style>
+          <a:lnRef idx="2">
+            <a:schemeClr val="accent1">
+              <a:shade val="50000"/>
+            </a:schemeClr>
+          </a:lnRef>
+          <a:fillRef idx="1">
+            <a:schemeClr val="accent1"/>
+          </a:fillRef>
+          <a:effectRef idx="0">
+            <a:schemeClr val="accent1"/>
+          </a:effectRef>
+          <a:fontRef idx="minor">
+            <a:schemeClr val="lt1"/>
+          </a:fontRef>
+        </p:style>
+        <p:txBody>
+          <a:bodyPr rtlCol="0" anchor="ctr"/>
+          <a:lstStyle/>
+          <a:p>
+            <a:pPr algn="ctr"/>
+            <a:endParaRPr lang="ko-KR" altLang="en-US"/>
+          </a:p>
+        </p:txBody>
+      </p:sp>
+      <p:sp>
+        <p:nvSpPr>
+          <p:cNvPr id="53" name="TextBox 52">
+            <a:extLst>
+              <a:ext uri="{FF2B5EF4-FFF2-40B4-BE49-F238E27FC236}">
+                <a16:creationId xmlns:a16="http://schemas.microsoft.com/office/drawing/2014/main" id="{B6A3435C-9BFD-4CCD-889B-52FEB09B3B23}"/>
+              </a:ext>
+            </a:extLst>
+          </p:cNvPr>
+          <p:cNvSpPr txBox="1"/>
+          <p:nvPr/>
+        </p:nvSpPr>
+        <p:spPr>
+          <a:xfrm>
+            <a:off x="2249883" y="3217016"/>
+            <a:ext cx="360996" cy="477054"/>
+          </a:xfrm>
+          <a:prstGeom prst="rect">
+            <a:avLst/>
+          </a:prstGeom>
+          <a:noFill/>
+        </p:spPr>
+        <p:txBody>
+          <a:bodyPr wrap="none" rtlCol="0">
+            <a:spAutoFit/>
+          </a:bodyPr>
+          <a:lstStyle/>
+          <a:p>
+            <a:r>
+              <a:rPr lang="en-US" altLang="ko-KR" sz="2500" dirty="0"/>
+              <a:t>2</a:t>
+            </a:r>
+            <a:endParaRPr lang="ko-KR" altLang="en-US" sz="2500" dirty="0"/>
+          </a:p>
+        </p:txBody>
+      </p:sp>
+      <p:sp>
+        <p:nvSpPr>
+          <p:cNvPr id="55" name="TextBox 54">
+            <a:extLst>
+              <a:ext uri="{FF2B5EF4-FFF2-40B4-BE49-F238E27FC236}">
+                <a16:creationId xmlns:a16="http://schemas.microsoft.com/office/drawing/2014/main" id="{A20298B8-728F-4A05-ACF8-9C3C4B74A8BC}"/>
+              </a:ext>
+            </a:extLst>
+          </p:cNvPr>
+          <p:cNvSpPr txBox="1"/>
+          <p:nvPr/>
+        </p:nvSpPr>
+        <p:spPr>
+          <a:xfrm>
+            <a:off x="2262311" y="4775355"/>
+            <a:ext cx="360996" cy="477054"/>
+          </a:xfrm>
+          <a:prstGeom prst="rect">
+            <a:avLst/>
+          </a:prstGeom>
+          <a:noFill/>
+        </p:spPr>
+        <p:txBody>
+          <a:bodyPr wrap="none" rtlCol="0">
+            <a:spAutoFit/>
+          </a:bodyPr>
+          <a:lstStyle/>
+          <a:p>
+            <a:r>
+              <a:rPr lang="en-US" altLang="ko-KR" sz="2500" dirty="0"/>
+              <a:t>4</a:t>
+            </a:r>
+            <a:endParaRPr lang="ko-KR" altLang="en-US" sz="2500" dirty="0"/>
+          </a:p>
+        </p:txBody>
+      </p:sp>
+      <p:sp>
+        <p:nvSpPr>
+          <p:cNvPr id="56" name="TextBox 55">
+            <a:extLst>
+              <a:ext uri="{FF2B5EF4-FFF2-40B4-BE49-F238E27FC236}">
+                <a16:creationId xmlns:a16="http://schemas.microsoft.com/office/drawing/2014/main" id="{51442F0F-20B2-4400-9601-46751CA2F76B}"/>
+              </a:ext>
+            </a:extLst>
+          </p:cNvPr>
+          <p:cNvSpPr txBox="1"/>
+          <p:nvPr/>
+        </p:nvSpPr>
+        <p:spPr>
+          <a:xfrm>
+            <a:off x="2262311" y="5603330"/>
+            <a:ext cx="360996" cy="477054"/>
+          </a:xfrm>
+          <a:prstGeom prst="rect">
+            <a:avLst/>
+          </a:prstGeom>
+          <a:noFill/>
+        </p:spPr>
+        <p:txBody>
+          <a:bodyPr wrap="none" rtlCol="0">
+            <a:spAutoFit/>
+          </a:bodyPr>
+          <a:lstStyle/>
+          <a:p>
+            <a:r>
+              <a:rPr lang="en-US" altLang="ko-KR" sz="2500" dirty="0"/>
+              <a:t>5</a:t>
+            </a:r>
+            <a:endParaRPr lang="ko-KR" altLang="en-US" sz="2500" dirty="0"/>
+          </a:p>
+        </p:txBody>
+      </p:sp>
+      <p:sp>
+        <p:nvSpPr>
+          <p:cNvPr id="57" name="TextBox 56">
+            <a:extLst>
+              <a:ext uri="{FF2B5EF4-FFF2-40B4-BE49-F238E27FC236}">
+                <a16:creationId xmlns:a16="http://schemas.microsoft.com/office/drawing/2014/main" id="{A53E2245-5351-4A84-8A19-CE2CE445E2D6}"/>
+              </a:ext>
+            </a:extLst>
+          </p:cNvPr>
+          <p:cNvSpPr txBox="1"/>
+          <p:nvPr/>
+        </p:nvSpPr>
+        <p:spPr>
+          <a:xfrm>
+            <a:off x="2262311" y="3998368"/>
+            <a:ext cx="360996" cy="477054"/>
+          </a:xfrm>
+          <a:prstGeom prst="rect">
+            <a:avLst/>
+          </a:prstGeom>
+          <a:noFill/>
+        </p:spPr>
+        <p:txBody>
+          <a:bodyPr wrap="none" rtlCol="0">
+            <a:spAutoFit/>
+          </a:bodyPr>
+          <a:lstStyle/>
+          <a:p>
+            <a:r>
+              <a:rPr lang="en-US" altLang="ko-KR" sz="2500" dirty="0"/>
+              <a:t>3</a:t>
+            </a:r>
+            <a:endParaRPr lang="ko-KR" altLang="en-US" sz="2500" dirty="0"/>
+          </a:p>
+        </p:txBody>
+      </p:sp>
+      <p:sp>
+        <p:nvSpPr>
+          <p:cNvPr id="58" name="TextBox 57">
+            <a:extLst>
+              <a:ext uri="{FF2B5EF4-FFF2-40B4-BE49-F238E27FC236}">
+                <a16:creationId xmlns:a16="http://schemas.microsoft.com/office/drawing/2014/main" id="{010463DF-BFDC-4853-A210-C9CD2EA7A267}"/>
+              </a:ext>
+            </a:extLst>
+          </p:cNvPr>
+          <p:cNvSpPr txBox="1"/>
+          <p:nvPr/>
+        </p:nvSpPr>
+        <p:spPr>
+          <a:xfrm>
+            <a:off x="3674342" y="4612348"/>
+            <a:ext cx="558166" cy="861774"/>
+          </a:xfrm>
+          <a:prstGeom prst="rect">
+            <a:avLst/>
+          </a:prstGeom>
+          <a:noFill/>
+        </p:spPr>
+        <p:txBody>
+          <a:bodyPr wrap="none" rtlCol="0">
+            <a:spAutoFit/>
+          </a:bodyPr>
+          <a:lstStyle/>
+          <a:p>
+            <a:r>
+              <a:rPr lang="en-US" altLang="ko-KR" sz="5000" dirty="0"/>
+              <a:t>B</a:t>
+            </a:r>
+            <a:endParaRPr lang="ko-KR" altLang="en-US" sz="5000" dirty="0"/>
+          </a:p>
+        </p:txBody>
+      </p:sp>
+      <p:sp>
+        <p:nvSpPr>
+          <p:cNvPr id="59" name="TextBox 58">
+            <a:extLst>
+              <a:ext uri="{FF2B5EF4-FFF2-40B4-BE49-F238E27FC236}">
+                <a16:creationId xmlns:a16="http://schemas.microsoft.com/office/drawing/2014/main" id="{3EA2D1B6-C9AB-44F2-8CCE-C8F15F971410}"/>
+              </a:ext>
+            </a:extLst>
+          </p:cNvPr>
+          <p:cNvSpPr txBox="1"/>
+          <p:nvPr/>
+        </p:nvSpPr>
+        <p:spPr>
+          <a:xfrm>
+            <a:off x="3635925" y="5461119"/>
+            <a:ext cx="606256" cy="861774"/>
+          </a:xfrm>
+          <a:prstGeom prst="rect">
+            <a:avLst/>
+          </a:prstGeom>
+          <a:noFill/>
+        </p:spPr>
+        <p:txBody>
+          <a:bodyPr wrap="none" rtlCol="0">
+            <a:spAutoFit/>
+          </a:bodyPr>
+          <a:lstStyle/>
+          <a:p>
+            <a:r>
+              <a:rPr lang="en-US" altLang="ko-KR" sz="5000" dirty="0"/>
+              <a:t>C</a:t>
+            </a:r>
+            <a:endParaRPr lang="ko-KR" altLang="en-US" sz="5000" dirty="0"/>
+          </a:p>
+        </p:txBody>
+      </p:sp>
+      <p:cxnSp>
+        <p:nvCxnSpPr>
+          <p:cNvPr id="11" name="직선 연결선 10">
+            <a:extLst>
+              <a:ext uri="{FF2B5EF4-FFF2-40B4-BE49-F238E27FC236}">
+                <a16:creationId xmlns:a16="http://schemas.microsoft.com/office/drawing/2014/main" id="{62356E44-86B6-4AAC-BACC-7A6E6C3F7CA8}"/>
+              </a:ext>
+            </a:extLst>
+          </p:cNvPr>
+          <p:cNvCxnSpPr>
+            <a:cxnSpLocks/>
+            <a:stCxn id="9" idx="0"/>
+            <a:endCxn id="9" idx="2"/>
+          </p:cNvCxnSpPr>
+          <p:nvPr/>
+        </p:nvCxnSpPr>
+        <p:spPr>
+          <a:xfrm>
+            <a:off x="3902625" y="793604"/>
+            <a:ext cx="0" cy="858653"/>
+          </a:xfrm>
+          <a:prstGeom prst="line">
+            <a:avLst/>
+          </a:prstGeom>
+        </p:spPr>
+        <p:style>
+          <a:lnRef idx="1">
+            <a:schemeClr val="dk1"/>
+          </a:lnRef>
+          <a:fillRef idx="0">
+            <a:schemeClr val="dk1"/>
+          </a:fillRef>
+          <a:effectRef idx="0">
+            <a:schemeClr val="dk1"/>
+          </a:effectRef>
+          <a:fontRef idx="minor">
+            <a:schemeClr val="tx1"/>
+          </a:fontRef>
+        </p:style>
+      </p:cxnSp>
+      <p:sp>
+        <p:nvSpPr>
+          <p:cNvPr id="61" name="TextBox 60">
+            <a:extLst>
+              <a:ext uri="{FF2B5EF4-FFF2-40B4-BE49-F238E27FC236}">
+                <a16:creationId xmlns:a16="http://schemas.microsoft.com/office/drawing/2014/main" id="{575380EC-D2A2-4EEC-8A5E-7385F6FC86DB}"/>
+              </a:ext>
+            </a:extLst>
+          </p:cNvPr>
+          <p:cNvSpPr txBox="1"/>
+          <p:nvPr/>
+        </p:nvSpPr>
+        <p:spPr>
+          <a:xfrm>
+            <a:off x="2530953" y="248068"/>
+            <a:ext cx="980625" cy="477054"/>
+          </a:xfrm>
+          <a:prstGeom prst="rect">
+            <a:avLst/>
+          </a:prstGeom>
+          <a:noFill/>
+        </p:spPr>
+        <p:txBody>
+          <a:bodyPr wrap="square" rtlCol="0">
+            <a:spAutoFit/>
+          </a:bodyPr>
+          <a:lstStyle/>
+          <a:p>
+            <a:r>
+              <a:rPr lang="en-US" altLang="ko-KR" sz="2500" dirty="0"/>
+              <a:t>Front</a:t>
+            </a:r>
+            <a:endParaRPr lang="ko-KR" altLang="en-US" sz="2500" dirty="0"/>
+          </a:p>
+        </p:txBody>
+      </p:sp>
+      <p:sp>
+        <p:nvSpPr>
+          <p:cNvPr id="62" name="TextBox 61">
+            <a:extLst>
+              <a:ext uri="{FF2B5EF4-FFF2-40B4-BE49-F238E27FC236}">
+                <a16:creationId xmlns:a16="http://schemas.microsoft.com/office/drawing/2014/main" id="{1069B8AF-3D75-40A2-AAED-5D98EE53CC77}"/>
+              </a:ext>
+            </a:extLst>
+          </p:cNvPr>
+          <p:cNvSpPr txBox="1"/>
+          <p:nvPr/>
+        </p:nvSpPr>
+        <p:spPr>
+          <a:xfrm>
+            <a:off x="4386011" y="268629"/>
+            <a:ext cx="822597" cy="477054"/>
+          </a:xfrm>
+          <a:prstGeom prst="rect">
+            <a:avLst/>
+          </a:prstGeom>
+          <a:noFill/>
+        </p:spPr>
+        <p:txBody>
+          <a:bodyPr wrap="none" rtlCol="0">
+            <a:spAutoFit/>
+          </a:bodyPr>
+          <a:lstStyle/>
+          <a:p>
+            <a:r>
+              <a:rPr lang="en-US" altLang="ko-KR" sz="2500" dirty="0"/>
+              <a:t>Rear</a:t>
+            </a:r>
+            <a:endParaRPr lang="ko-KR" altLang="en-US" sz="2500" dirty="0"/>
+          </a:p>
+        </p:txBody>
+      </p:sp>
+      <p:sp>
+        <p:nvSpPr>
+          <p:cNvPr id="63" name="TextBox 62">
+            <a:extLst>
+              <a:ext uri="{FF2B5EF4-FFF2-40B4-BE49-F238E27FC236}">
+                <a16:creationId xmlns:a16="http://schemas.microsoft.com/office/drawing/2014/main" id="{6D031FA4-E416-412F-9CD1-3946842C8840}"/>
+              </a:ext>
+            </a:extLst>
+          </p:cNvPr>
+          <p:cNvSpPr txBox="1"/>
+          <p:nvPr/>
+        </p:nvSpPr>
+        <p:spPr>
+          <a:xfrm>
+            <a:off x="2752603" y="782535"/>
+            <a:ext cx="537327" cy="861774"/>
+          </a:xfrm>
+          <a:prstGeom prst="rect">
+            <a:avLst/>
+          </a:prstGeom>
+          <a:noFill/>
+        </p:spPr>
+        <p:txBody>
+          <a:bodyPr wrap="none" rtlCol="0">
+            <a:spAutoFit/>
+          </a:bodyPr>
+          <a:lstStyle/>
+          <a:p>
+            <a:r>
+              <a:rPr lang="en-US" altLang="ko-KR" sz="5000" dirty="0"/>
+              <a:t>3</a:t>
+            </a:r>
+            <a:endParaRPr lang="ko-KR" altLang="en-US" sz="5000" dirty="0"/>
+          </a:p>
+        </p:txBody>
+      </p:sp>
+      <p:sp>
+        <p:nvSpPr>
+          <p:cNvPr id="64" name="TextBox 63">
+            <a:extLst>
+              <a:ext uri="{FF2B5EF4-FFF2-40B4-BE49-F238E27FC236}">
+                <a16:creationId xmlns:a16="http://schemas.microsoft.com/office/drawing/2014/main" id="{CEB07D1F-B3AC-4FC0-B081-55F1460CF976}"/>
+              </a:ext>
+            </a:extLst>
+          </p:cNvPr>
+          <p:cNvSpPr txBox="1"/>
+          <p:nvPr/>
+        </p:nvSpPr>
+        <p:spPr>
+          <a:xfrm>
+            <a:off x="4508325" y="789758"/>
+            <a:ext cx="537327" cy="861774"/>
+          </a:xfrm>
+          <a:prstGeom prst="rect">
+            <a:avLst/>
+          </a:prstGeom>
+          <a:noFill/>
+        </p:spPr>
+        <p:txBody>
+          <a:bodyPr wrap="none" rtlCol="0">
+            <a:spAutoFit/>
+          </a:bodyPr>
+          <a:lstStyle/>
+          <a:p>
+            <a:r>
+              <a:rPr lang="en-US" altLang="ko-KR" sz="5000" dirty="0"/>
+              <a:t>5</a:t>
+            </a:r>
+            <a:endParaRPr lang="ko-KR" altLang="en-US" sz="5000" dirty="0"/>
+          </a:p>
+        </p:txBody>
+      </p:sp>
+      <p:sp>
+        <p:nvSpPr>
+          <p:cNvPr id="65" name="직사각형 64">
+            <a:extLst>
+              <a:ext uri="{FF2B5EF4-FFF2-40B4-BE49-F238E27FC236}">
+                <a16:creationId xmlns:a16="http://schemas.microsoft.com/office/drawing/2014/main" id="{51BBCA6C-0314-4E11-BA47-11DFCC531825}"/>
+              </a:ext>
+            </a:extLst>
+          </p:cNvPr>
+          <p:cNvSpPr/>
+          <p:nvPr/>
+        </p:nvSpPr>
+        <p:spPr>
+          <a:xfrm>
+            <a:off x="7497664" y="2245307"/>
+            <a:ext cx="2283681" cy="4041059"/>
+          </a:xfrm>
+          <a:prstGeom prst="rect">
+            <a:avLst/>
+          </a:prstGeom>
+        </p:spPr>
+        <p:style>
+          <a:lnRef idx="2">
+            <a:schemeClr val="dk1"/>
+          </a:lnRef>
+          <a:fillRef idx="1">
+            <a:schemeClr val="lt1"/>
+          </a:fillRef>
+          <a:effectRef idx="0">
+            <a:schemeClr val="dk1"/>
+          </a:effectRef>
+          <a:fontRef idx="minor">
+            <a:schemeClr val="dk1"/>
+          </a:fontRef>
+        </p:style>
+        <p:txBody>
+          <a:bodyPr rtlCol="0" anchor="ctr"/>
+          <a:lstStyle/>
+          <a:p>
+            <a:pPr algn="ctr"/>
+            <a:endParaRPr lang="ko-KR" altLang="en-US"/>
+          </a:p>
+        </p:txBody>
+      </p:sp>
+      <p:cxnSp>
+        <p:nvCxnSpPr>
+          <p:cNvPr id="66" name="직선 연결선 65">
+            <a:extLst>
+              <a:ext uri="{FF2B5EF4-FFF2-40B4-BE49-F238E27FC236}">
+                <a16:creationId xmlns:a16="http://schemas.microsoft.com/office/drawing/2014/main" id="{969F2566-4182-4F02-A049-C4FC24A16506}"/>
+              </a:ext>
+            </a:extLst>
+          </p:cNvPr>
+          <p:cNvCxnSpPr>
+            <a:cxnSpLocks/>
+          </p:cNvCxnSpPr>
+          <p:nvPr/>
+        </p:nvCxnSpPr>
+        <p:spPr>
+          <a:xfrm>
+            <a:off x="7497664" y="3031887"/>
+            <a:ext cx="2272030" cy="0"/>
+          </a:xfrm>
+          <a:prstGeom prst="line">
+            <a:avLst/>
+          </a:prstGeom>
+        </p:spPr>
+        <p:style>
+          <a:lnRef idx="1">
+            <a:schemeClr val="dk1"/>
+          </a:lnRef>
+          <a:fillRef idx="0">
+            <a:schemeClr val="dk1"/>
+          </a:fillRef>
+          <a:effectRef idx="0">
+            <a:schemeClr val="dk1"/>
+          </a:effectRef>
+          <a:fontRef idx="minor">
+            <a:schemeClr val="tx1"/>
+          </a:fontRef>
+        </p:style>
+      </p:cxnSp>
+      <p:cxnSp>
+        <p:nvCxnSpPr>
+          <p:cNvPr id="67" name="직선 연결선 66">
+            <a:extLst>
+              <a:ext uri="{FF2B5EF4-FFF2-40B4-BE49-F238E27FC236}">
+                <a16:creationId xmlns:a16="http://schemas.microsoft.com/office/drawing/2014/main" id="{7BA8E1D2-5685-4D2B-8138-3D519389E733}"/>
+              </a:ext>
+            </a:extLst>
+          </p:cNvPr>
+          <p:cNvCxnSpPr>
+            <a:cxnSpLocks/>
+          </p:cNvCxnSpPr>
+          <p:nvPr/>
+        </p:nvCxnSpPr>
+        <p:spPr>
+          <a:xfrm>
+            <a:off x="7497664" y="3818467"/>
+            <a:ext cx="2272030" cy="0"/>
+          </a:xfrm>
+          <a:prstGeom prst="line">
+            <a:avLst/>
+          </a:prstGeom>
+        </p:spPr>
+        <p:style>
+          <a:lnRef idx="1">
+            <a:schemeClr val="dk1"/>
+          </a:lnRef>
+          <a:fillRef idx="0">
+            <a:schemeClr val="dk1"/>
+          </a:fillRef>
+          <a:effectRef idx="0">
+            <a:schemeClr val="dk1"/>
+          </a:effectRef>
+          <a:fontRef idx="minor">
+            <a:schemeClr val="tx1"/>
+          </a:fontRef>
+        </p:style>
+      </p:cxnSp>
+      <p:cxnSp>
+        <p:nvCxnSpPr>
+          <p:cNvPr id="68" name="직선 연결선 67">
+            <a:extLst>
+              <a:ext uri="{FF2B5EF4-FFF2-40B4-BE49-F238E27FC236}">
+                <a16:creationId xmlns:a16="http://schemas.microsoft.com/office/drawing/2014/main" id="{9B40127C-A1B6-4930-8C57-B00AB8EE661D}"/>
+              </a:ext>
+            </a:extLst>
+          </p:cNvPr>
+          <p:cNvCxnSpPr>
+            <a:cxnSpLocks/>
+          </p:cNvCxnSpPr>
+          <p:nvPr/>
+        </p:nvCxnSpPr>
+        <p:spPr>
+          <a:xfrm>
+            <a:off x="7485374" y="4585384"/>
+            <a:ext cx="2272030" cy="0"/>
+          </a:xfrm>
+          <a:prstGeom prst="line">
+            <a:avLst/>
+          </a:prstGeom>
+        </p:spPr>
+        <p:style>
+          <a:lnRef idx="1">
+            <a:schemeClr val="dk1"/>
+          </a:lnRef>
+          <a:fillRef idx="0">
+            <a:schemeClr val="dk1"/>
+          </a:fillRef>
+          <a:effectRef idx="0">
+            <a:schemeClr val="dk1"/>
+          </a:effectRef>
+          <a:fontRef idx="minor">
+            <a:schemeClr val="tx1"/>
+          </a:fontRef>
+        </p:style>
+      </p:cxnSp>
+      <p:cxnSp>
+        <p:nvCxnSpPr>
+          <p:cNvPr id="69" name="직선 연결선 68">
+            <a:extLst>
+              <a:ext uri="{FF2B5EF4-FFF2-40B4-BE49-F238E27FC236}">
+                <a16:creationId xmlns:a16="http://schemas.microsoft.com/office/drawing/2014/main" id="{86D001E8-9488-42B3-A743-47765D7C1F13}"/>
+              </a:ext>
+            </a:extLst>
+          </p:cNvPr>
+          <p:cNvCxnSpPr>
+            <a:cxnSpLocks/>
+          </p:cNvCxnSpPr>
+          <p:nvPr/>
+        </p:nvCxnSpPr>
+        <p:spPr>
+          <a:xfrm>
+            <a:off x="7485374" y="5426041"/>
+            <a:ext cx="2272030" cy="0"/>
+          </a:xfrm>
+          <a:prstGeom prst="line">
+            <a:avLst/>
+          </a:prstGeom>
+        </p:spPr>
+        <p:style>
+          <a:lnRef idx="1">
+            <a:schemeClr val="dk1"/>
+          </a:lnRef>
+          <a:fillRef idx="0">
+            <a:schemeClr val="dk1"/>
+          </a:fillRef>
+          <a:effectRef idx="0">
+            <a:schemeClr val="dk1"/>
+          </a:effectRef>
+          <a:fontRef idx="minor">
+            <a:schemeClr val="tx1"/>
+          </a:fontRef>
+        </p:style>
+      </p:cxnSp>
+      <p:sp>
+        <p:nvSpPr>
+          <p:cNvPr id="70" name="TextBox 69">
+            <a:extLst>
+              <a:ext uri="{FF2B5EF4-FFF2-40B4-BE49-F238E27FC236}">
+                <a16:creationId xmlns:a16="http://schemas.microsoft.com/office/drawing/2014/main" id="{31DD8ECD-50C8-4130-BFEA-834AAD2F85F0}"/>
+              </a:ext>
+            </a:extLst>
+          </p:cNvPr>
+          <p:cNvSpPr txBox="1"/>
+          <p:nvPr/>
+        </p:nvSpPr>
+        <p:spPr>
+          <a:xfrm>
+            <a:off x="8337764" y="5416629"/>
+            <a:ext cx="591829" cy="861774"/>
+          </a:xfrm>
+          <a:prstGeom prst="rect">
+            <a:avLst/>
+          </a:prstGeom>
+          <a:noFill/>
+        </p:spPr>
+        <p:txBody>
+          <a:bodyPr wrap="none" rtlCol="0">
+            <a:spAutoFit/>
+          </a:bodyPr>
+          <a:lstStyle/>
+          <a:p>
+            <a:r>
+              <a:rPr lang="en-US" altLang="ko-KR" sz="5000" dirty="0"/>
+              <a:t>C</a:t>
+            </a:r>
+            <a:endParaRPr lang="ko-KR" altLang="en-US" sz="5000" dirty="0"/>
+          </a:p>
+        </p:txBody>
+      </p:sp>
+      <p:sp>
+        <p:nvSpPr>
+          <p:cNvPr id="71" name="TextBox 70">
+            <a:extLst>
+              <a:ext uri="{FF2B5EF4-FFF2-40B4-BE49-F238E27FC236}">
+                <a16:creationId xmlns:a16="http://schemas.microsoft.com/office/drawing/2014/main" id="{85F2816D-0C96-4F08-A4EB-29CEB5C64FB0}"/>
+              </a:ext>
+            </a:extLst>
+          </p:cNvPr>
+          <p:cNvSpPr txBox="1"/>
+          <p:nvPr/>
+        </p:nvSpPr>
+        <p:spPr>
+          <a:xfrm>
+            <a:off x="6950025" y="2416436"/>
+            <a:ext cx="360996" cy="477054"/>
+          </a:xfrm>
+          <a:prstGeom prst="rect">
+            <a:avLst/>
+          </a:prstGeom>
+          <a:noFill/>
+        </p:spPr>
+        <p:txBody>
+          <a:bodyPr wrap="none" rtlCol="0">
+            <a:spAutoFit/>
+          </a:bodyPr>
+          <a:lstStyle/>
+          <a:p>
+            <a:r>
+              <a:rPr lang="en-US" altLang="ko-KR" sz="2500" dirty="0"/>
+              <a:t>1</a:t>
+            </a:r>
+            <a:endParaRPr lang="ko-KR" altLang="en-US" sz="2500" dirty="0"/>
+          </a:p>
+        </p:txBody>
+      </p:sp>
+      <p:sp>
+        <p:nvSpPr>
+          <p:cNvPr id="73" name="TextBox 72">
+            <a:extLst>
+              <a:ext uri="{FF2B5EF4-FFF2-40B4-BE49-F238E27FC236}">
+                <a16:creationId xmlns:a16="http://schemas.microsoft.com/office/drawing/2014/main" id="{6D369031-2B64-4F13-BA73-C21A7D9B5091}"/>
+              </a:ext>
+            </a:extLst>
+          </p:cNvPr>
+          <p:cNvSpPr txBox="1"/>
+          <p:nvPr/>
+        </p:nvSpPr>
+        <p:spPr>
+          <a:xfrm>
+            <a:off x="6950025" y="3217016"/>
+            <a:ext cx="360996" cy="477054"/>
+          </a:xfrm>
+          <a:prstGeom prst="rect">
+            <a:avLst/>
+          </a:prstGeom>
+          <a:noFill/>
+        </p:spPr>
+        <p:txBody>
+          <a:bodyPr wrap="none" rtlCol="0">
+            <a:spAutoFit/>
+          </a:bodyPr>
+          <a:lstStyle/>
+          <a:p>
+            <a:r>
+              <a:rPr lang="en-US" altLang="ko-KR" sz="2500" dirty="0"/>
+              <a:t>2</a:t>
+            </a:r>
+            <a:endParaRPr lang="ko-KR" altLang="en-US" sz="2500" dirty="0"/>
+          </a:p>
+        </p:txBody>
+      </p:sp>
+      <p:sp>
+        <p:nvSpPr>
+          <p:cNvPr id="74" name="TextBox 73">
+            <a:extLst>
+              <a:ext uri="{FF2B5EF4-FFF2-40B4-BE49-F238E27FC236}">
+                <a16:creationId xmlns:a16="http://schemas.microsoft.com/office/drawing/2014/main" id="{5BF84026-D944-4875-AF41-6354A4ABF6E2}"/>
+              </a:ext>
+            </a:extLst>
+          </p:cNvPr>
+          <p:cNvSpPr txBox="1"/>
+          <p:nvPr/>
+        </p:nvSpPr>
+        <p:spPr>
+          <a:xfrm>
+            <a:off x="6962453" y="4744875"/>
+            <a:ext cx="360996" cy="477054"/>
+          </a:xfrm>
+          <a:prstGeom prst="rect">
+            <a:avLst/>
+          </a:prstGeom>
+          <a:noFill/>
+        </p:spPr>
+        <p:txBody>
+          <a:bodyPr wrap="none" rtlCol="0">
+            <a:spAutoFit/>
+          </a:bodyPr>
+          <a:lstStyle/>
+          <a:p>
+            <a:r>
+              <a:rPr lang="en-US" altLang="ko-KR" sz="2500" dirty="0"/>
+              <a:t>4</a:t>
+            </a:r>
+            <a:endParaRPr lang="ko-KR" altLang="en-US" sz="2500" dirty="0"/>
+          </a:p>
+        </p:txBody>
+      </p:sp>
+      <p:sp>
+        <p:nvSpPr>
+          <p:cNvPr id="75" name="TextBox 74">
+            <a:extLst>
+              <a:ext uri="{FF2B5EF4-FFF2-40B4-BE49-F238E27FC236}">
+                <a16:creationId xmlns:a16="http://schemas.microsoft.com/office/drawing/2014/main" id="{AD33C10F-377D-43B2-9F71-6B194DCA67D2}"/>
+              </a:ext>
+            </a:extLst>
+          </p:cNvPr>
+          <p:cNvSpPr txBox="1"/>
+          <p:nvPr/>
+        </p:nvSpPr>
+        <p:spPr>
+          <a:xfrm>
+            <a:off x="6962453" y="5603330"/>
+            <a:ext cx="360996" cy="477054"/>
+          </a:xfrm>
+          <a:prstGeom prst="rect">
+            <a:avLst/>
+          </a:prstGeom>
+          <a:noFill/>
+        </p:spPr>
+        <p:txBody>
+          <a:bodyPr wrap="none" rtlCol="0">
+            <a:spAutoFit/>
+          </a:bodyPr>
+          <a:lstStyle/>
+          <a:p>
+            <a:r>
+              <a:rPr lang="en-US" altLang="ko-KR" sz="2500" dirty="0"/>
+              <a:t>5</a:t>
+            </a:r>
+            <a:endParaRPr lang="ko-KR" altLang="en-US" sz="2500" dirty="0"/>
+          </a:p>
+        </p:txBody>
+      </p:sp>
+      <p:sp>
+        <p:nvSpPr>
+          <p:cNvPr id="76" name="TextBox 75">
+            <a:extLst>
+              <a:ext uri="{FF2B5EF4-FFF2-40B4-BE49-F238E27FC236}">
+                <a16:creationId xmlns:a16="http://schemas.microsoft.com/office/drawing/2014/main" id="{C06C8984-B98F-444A-8476-D9D77F9DC052}"/>
+              </a:ext>
+            </a:extLst>
+          </p:cNvPr>
+          <p:cNvSpPr txBox="1"/>
+          <p:nvPr/>
+        </p:nvSpPr>
+        <p:spPr>
+          <a:xfrm>
+            <a:off x="6962453" y="3998368"/>
+            <a:ext cx="360996" cy="477054"/>
+          </a:xfrm>
+          <a:prstGeom prst="rect">
+            <a:avLst/>
+          </a:prstGeom>
+          <a:noFill/>
+        </p:spPr>
+        <p:txBody>
+          <a:bodyPr wrap="none" rtlCol="0">
+            <a:spAutoFit/>
+          </a:bodyPr>
+          <a:lstStyle/>
+          <a:p>
+            <a:r>
+              <a:rPr lang="en-US" altLang="ko-KR" sz="2500" dirty="0"/>
+              <a:t>3</a:t>
+            </a:r>
+            <a:endParaRPr lang="ko-KR" altLang="en-US" sz="2500" dirty="0"/>
+          </a:p>
+        </p:txBody>
+      </p:sp>
+      <p:sp>
+        <p:nvSpPr>
+          <p:cNvPr id="77" name="TextBox 76">
+            <a:extLst>
+              <a:ext uri="{FF2B5EF4-FFF2-40B4-BE49-F238E27FC236}">
+                <a16:creationId xmlns:a16="http://schemas.microsoft.com/office/drawing/2014/main" id="{7D48B1A4-C8C4-4848-9122-0678CF3EF98A}"/>
+              </a:ext>
+            </a:extLst>
+          </p:cNvPr>
+          <p:cNvSpPr txBox="1"/>
+          <p:nvPr/>
+        </p:nvSpPr>
+        <p:spPr>
+          <a:xfrm>
+            <a:off x="8371286" y="3793475"/>
+            <a:ext cx="606256" cy="861774"/>
+          </a:xfrm>
+          <a:prstGeom prst="rect">
+            <a:avLst/>
+          </a:prstGeom>
+          <a:noFill/>
+        </p:spPr>
+        <p:txBody>
+          <a:bodyPr wrap="none" rtlCol="0">
+            <a:spAutoFit/>
+          </a:bodyPr>
+          <a:lstStyle/>
+          <a:p>
+            <a:r>
+              <a:rPr lang="en-US" altLang="ko-KR" sz="5000" dirty="0"/>
+              <a:t>A</a:t>
+            </a:r>
+            <a:endParaRPr lang="ko-KR" altLang="en-US" sz="5000" dirty="0"/>
+          </a:p>
+        </p:txBody>
+      </p:sp>
+      <p:sp>
+        <p:nvSpPr>
+          <p:cNvPr id="78" name="TextBox 77">
+            <a:extLst>
+              <a:ext uri="{FF2B5EF4-FFF2-40B4-BE49-F238E27FC236}">
+                <a16:creationId xmlns:a16="http://schemas.microsoft.com/office/drawing/2014/main" id="{E792EAF4-5FFC-492D-86B6-AFCA3170CD8B}"/>
+              </a:ext>
+            </a:extLst>
+          </p:cNvPr>
+          <p:cNvSpPr txBox="1"/>
+          <p:nvPr/>
+        </p:nvSpPr>
+        <p:spPr>
+          <a:xfrm>
+            <a:off x="8393949" y="4621530"/>
+            <a:ext cx="558166" cy="861774"/>
+          </a:xfrm>
+          <a:prstGeom prst="rect">
+            <a:avLst/>
+          </a:prstGeom>
+          <a:noFill/>
+        </p:spPr>
+        <p:txBody>
+          <a:bodyPr wrap="none" rtlCol="0">
+            <a:spAutoFit/>
+          </a:bodyPr>
+          <a:lstStyle/>
+          <a:p>
+            <a:r>
+              <a:rPr lang="en-US" altLang="ko-KR" sz="5000" dirty="0"/>
+              <a:t>B</a:t>
+            </a:r>
+            <a:endParaRPr lang="ko-KR" altLang="en-US" sz="5000" dirty="0"/>
+          </a:p>
+        </p:txBody>
+      </p:sp>
+      <p:sp>
+        <p:nvSpPr>
+          <p:cNvPr id="103" name="직사각형 102">
+            <a:extLst>
+              <a:ext uri="{FF2B5EF4-FFF2-40B4-BE49-F238E27FC236}">
+                <a16:creationId xmlns:a16="http://schemas.microsoft.com/office/drawing/2014/main" id="{10D7B2A2-1833-4009-A700-ACFD7014FBB9}"/>
+              </a:ext>
+            </a:extLst>
+          </p:cNvPr>
+          <p:cNvSpPr/>
+          <p:nvPr/>
+        </p:nvSpPr>
+        <p:spPr>
+          <a:xfrm>
+            <a:off x="6930629" y="793604"/>
+            <a:ext cx="3451143" cy="858653"/>
+          </a:xfrm>
+          <a:prstGeom prst="rect">
+            <a:avLst/>
+          </a:prstGeom>
+          <a:noFill/>
+          <a:ln>
+            <a:solidFill>
+              <a:schemeClr val="tx1"/>
+            </a:solidFill>
+          </a:ln>
+        </p:spPr>
+        <p:style>
+          <a:lnRef idx="2">
+            <a:schemeClr val="accent1">
+              <a:shade val="50000"/>
+            </a:schemeClr>
+          </a:lnRef>
+          <a:fillRef idx="1">
+            <a:schemeClr val="accent1"/>
+          </a:fillRef>
+          <a:effectRef idx="0">
+            <a:schemeClr val="accent1"/>
+          </a:effectRef>
+          <a:fontRef idx="minor">
+            <a:schemeClr val="lt1"/>
+          </a:fontRef>
+        </p:style>
+        <p:txBody>
+          <a:bodyPr rtlCol="0" anchor="ctr"/>
+          <a:lstStyle/>
+          <a:p>
+            <a:pPr algn="ctr"/>
+            <a:endParaRPr lang="ko-KR" altLang="en-US"/>
+          </a:p>
+        </p:txBody>
+      </p:sp>
+      <p:cxnSp>
+        <p:nvCxnSpPr>
+          <p:cNvPr id="104" name="직선 연결선 103">
+            <a:extLst>
+              <a:ext uri="{FF2B5EF4-FFF2-40B4-BE49-F238E27FC236}">
+                <a16:creationId xmlns:a16="http://schemas.microsoft.com/office/drawing/2014/main" id="{69C19752-EE24-434A-BA94-AE56D12C4FA4}"/>
+              </a:ext>
+            </a:extLst>
+          </p:cNvPr>
+          <p:cNvCxnSpPr>
+            <a:cxnSpLocks/>
+            <a:stCxn id="103" idx="0"/>
+            <a:endCxn id="103" idx="2"/>
+          </p:cNvCxnSpPr>
+          <p:nvPr/>
+        </p:nvCxnSpPr>
+        <p:spPr>
+          <a:xfrm>
+            <a:off x="8656201" y="793604"/>
+            <a:ext cx="0" cy="858653"/>
+          </a:xfrm>
+          <a:prstGeom prst="line">
+            <a:avLst/>
+          </a:prstGeom>
+        </p:spPr>
+        <p:style>
+          <a:lnRef idx="1">
+            <a:schemeClr val="dk1"/>
+          </a:lnRef>
+          <a:fillRef idx="0">
+            <a:schemeClr val="dk1"/>
+          </a:fillRef>
+          <a:effectRef idx="0">
+            <a:schemeClr val="dk1"/>
+          </a:effectRef>
+          <a:fontRef idx="minor">
+            <a:schemeClr val="tx1"/>
+          </a:fontRef>
+        </p:style>
+      </p:cxnSp>
+      <p:sp>
+        <p:nvSpPr>
+          <p:cNvPr id="105" name="TextBox 104">
+            <a:extLst>
+              <a:ext uri="{FF2B5EF4-FFF2-40B4-BE49-F238E27FC236}">
+                <a16:creationId xmlns:a16="http://schemas.microsoft.com/office/drawing/2014/main" id="{A91E0AB8-C555-445D-8A14-922B3B6011D8}"/>
+              </a:ext>
+            </a:extLst>
+          </p:cNvPr>
+          <p:cNvSpPr txBox="1"/>
+          <p:nvPr/>
+        </p:nvSpPr>
+        <p:spPr>
+          <a:xfrm>
+            <a:off x="7284531" y="248068"/>
+            <a:ext cx="980621" cy="477054"/>
+          </a:xfrm>
+          <a:prstGeom prst="rect">
+            <a:avLst/>
+          </a:prstGeom>
+          <a:noFill/>
+        </p:spPr>
+        <p:txBody>
+          <a:bodyPr wrap="square" rtlCol="0">
+            <a:spAutoFit/>
+          </a:bodyPr>
+          <a:lstStyle/>
+          <a:p>
+            <a:r>
+              <a:rPr lang="en-US" altLang="ko-KR" sz="2500" dirty="0"/>
+              <a:t>Front</a:t>
+            </a:r>
+            <a:endParaRPr lang="ko-KR" altLang="en-US" sz="2500" dirty="0"/>
+          </a:p>
+        </p:txBody>
+      </p:sp>
+      <p:sp>
+        <p:nvSpPr>
+          <p:cNvPr id="106" name="TextBox 105">
+            <a:extLst>
+              <a:ext uri="{FF2B5EF4-FFF2-40B4-BE49-F238E27FC236}">
+                <a16:creationId xmlns:a16="http://schemas.microsoft.com/office/drawing/2014/main" id="{0826FEAB-ECF2-4FE9-8348-78CEC490D84C}"/>
+              </a:ext>
+            </a:extLst>
+          </p:cNvPr>
+          <p:cNvSpPr txBox="1"/>
+          <p:nvPr/>
+        </p:nvSpPr>
+        <p:spPr>
+          <a:xfrm>
+            <a:off x="9086859" y="279720"/>
+            <a:ext cx="822597" cy="477054"/>
+          </a:xfrm>
+          <a:prstGeom prst="rect">
+            <a:avLst/>
+          </a:prstGeom>
+          <a:noFill/>
+        </p:spPr>
+        <p:txBody>
+          <a:bodyPr wrap="none" rtlCol="0">
+            <a:spAutoFit/>
+          </a:bodyPr>
+          <a:lstStyle/>
+          <a:p>
+            <a:r>
+              <a:rPr lang="en-US" altLang="ko-KR" sz="2500" dirty="0"/>
+              <a:t>Rear</a:t>
+            </a:r>
+            <a:endParaRPr lang="ko-KR" altLang="en-US" sz="2500" dirty="0"/>
+          </a:p>
+        </p:txBody>
+      </p:sp>
+      <p:sp>
+        <p:nvSpPr>
+          <p:cNvPr id="107" name="TextBox 106">
+            <a:extLst>
+              <a:ext uri="{FF2B5EF4-FFF2-40B4-BE49-F238E27FC236}">
+                <a16:creationId xmlns:a16="http://schemas.microsoft.com/office/drawing/2014/main" id="{6C6BB60A-DF01-4C87-BCF8-D5A8C1398225}"/>
+              </a:ext>
+            </a:extLst>
+          </p:cNvPr>
+          <p:cNvSpPr txBox="1"/>
+          <p:nvPr/>
+        </p:nvSpPr>
+        <p:spPr>
+          <a:xfrm>
+            <a:off x="7506179" y="782535"/>
+            <a:ext cx="537327" cy="861774"/>
+          </a:xfrm>
+          <a:prstGeom prst="rect">
+            <a:avLst/>
+          </a:prstGeom>
+          <a:noFill/>
+        </p:spPr>
+        <p:txBody>
+          <a:bodyPr wrap="none" rtlCol="0">
+            <a:spAutoFit/>
+          </a:bodyPr>
+          <a:lstStyle/>
+          <a:p>
+            <a:r>
+              <a:rPr lang="en-US" altLang="ko-KR" sz="5000" dirty="0"/>
+              <a:t>3</a:t>
+            </a:r>
+            <a:endParaRPr lang="ko-KR" altLang="en-US" sz="5000" dirty="0"/>
+          </a:p>
+        </p:txBody>
+      </p:sp>
+      <p:sp>
+        <p:nvSpPr>
+          <p:cNvPr id="108" name="TextBox 107">
+            <a:extLst>
+              <a:ext uri="{FF2B5EF4-FFF2-40B4-BE49-F238E27FC236}">
+                <a16:creationId xmlns:a16="http://schemas.microsoft.com/office/drawing/2014/main" id="{A2D54C62-5EF4-41FE-8A49-ABB08FEB3307}"/>
+              </a:ext>
+            </a:extLst>
+          </p:cNvPr>
+          <p:cNvSpPr txBox="1"/>
+          <p:nvPr/>
+        </p:nvSpPr>
+        <p:spPr>
+          <a:xfrm>
+            <a:off x="9229495" y="779924"/>
+            <a:ext cx="537327" cy="861774"/>
+          </a:xfrm>
+          <a:prstGeom prst="rect">
+            <a:avLst/>
+          </a:prstGeom>
+          <a:noFill/>
+        </p:spPr>
+        <p:txBody>
+          <a:bodyPr wrap="none" rtlCol="0">
+            <a:spAutoFit/>
+          </a:bodyPr>
+          <a:lstStyle/>
+          <a:p>
+            <a:r>
+              <a:rPr lang="en-US" altLang="ko-KR" sz="5000" dirty="0"/>
+              <a:t>1</a:t>
+            </a:r>
+            <a:endParaRPr lang="ko-KR" altLang="en-US" sz="5000" dirty="0"/>
+          </a:p>
+        </p:txBody>
+      </p:sp>
+      <p:sp>
+        <p:nvSpPr>
+          <p:cNvPr id="40" name="TextBox 39">
+            <a:extLst>
+              <a:ext uri="{FF2B5EF4-FFF2-40B4-BE49-F238E27FC236}">
+                <a16:creationId xmlns:a16="http://schemas.microsoft.com/office/drawing/2014/main" id="{7C5DF330-7D42-44B4-B91D-8FC4AADAADF8}"/>
+              </a:ext>
+            </a:extLst>
+          </p:cNvPr>
+          <p:cNvSpPr txBox="1"/>
+          <p:nvPr/>
+        </p:nvSpPr>
+        <p:spPr>
+          <a:xfrm>
+            <a:off x="8337764" y="2246488"/>
+            <a:ext cx="644728" cy="861774"/>
+          </a:xfrm>
+          <a:prstGeom prst="rect">
+            <a:avLst/>
+          </a:prstGeom>
+          <a:noFill/>
+        </p:spPr>
+        <p:txBody>
+          <a:bodyPr wrap="none" rtlCol="0">
+            <a:spAutoFit/>
+          </a:bodyPr>
+          <a:lstStyle/>
+          <a:p>
+            <a:r>
+              <a:rPr lang="en-US" altLang="ko-KR" sz="5000" dirty="0"/>
+              <a:t>D</a:t>
+            </a:r>
+            <a:endParaRPr lang="ko-KR" altLang="en-US" sz="5000" dirty="0"/>
+          </a:p>
+        </p:txBody>
+      </p:sp>
+    </p:spTree>
+    <p:extLst>
+      <p:ext uri="{BB962C8B-B14F-4D97-AF65-F5344CB8AC3E}">
+        <p14:creationId xmlns:p14="http://schemas.microsoft.com/office/powerpoint/2010/main" val="3075600799"/>
       </p:ext>
     </p:extLst>
   </p:cSld>

</xml_diff>